<commit_message>
Changes to model now make the model have the init script outsourced in generate_cell_data.py . Thus, all changes now stem from there. Also, changes to how hysteresis is calculated (In the core library battery, there is a bug. Q is not scaled by 3600 but still calculated as As). Init dyn script is now 100% instead of 90% because it gave the wrong values for eta and Q for dynamic scripts.
Important to note is that the simulation slow down is causing ery small changes. It is ok to slow down simulation.

generate_pickled_cell_model.py now also prints the error with regards to actual default parameters.

Some changes in Dynamic script but mostly code cleanup.
</commit_message>
<xml_diff>
--- a/Docs/First output model for Typhoon 15.10.2022.pptx
+++ b/Docs/First output model for Typhoon 15.10.2022.pptx
@@ -8,11 +8,19 @@
     <p:sldId id="256" r:id="rId2"/>
     <p:sldId id="259" r:id="rId3"/>
     <p:sldId id="257" r:id="rId4"/>
-    <p:sldId id="260" r:id="rId5"/>
-    <p:sldId id="261" r:id="rId6"/>
-    <p:sldId id="262" r:id="rId7"/>
-    <p:sldId id="263" r:id="rId8"/>
-    <p:sldId id="264" r:id="rId9"/>
+    <p:sldId id="266" r:id="rId5"/>
+    <p:sldId id="267" r:id="rId6"/>
+    <p:sldId id="260" r:id="rId7"/>
+    <p:sldId id="261" r:id="rId8"/>
+    <p:sldId id="262" r:id="rId9"/>
+    <p:sldId id="263" r:id="rId10"/>
+    <p:sldId id="264" r:id="rId11"/>
+    <p:sldId id="268" r:id="rId12"/>
+    <p:sldId id="269" r:id="rId13"/>
+    <p:sldId id="270" r:id="rId14"/>
+    <p:sldId id="271" r:id="rId15"/>
+    <p:sldId id="272" r:id="rId16"/>
+    <p:sldId id="273" r:id="rId17"/>
   </p:sldIdLst>
   <p:sldSz cx="12192000" cy="6858000"/>
   <p:notesSz cx="6858000" cy="9144000"/>
@@ -111,6 +119,43 @@
       </a:defRPr>
     </a:lvl9pPr>
   </p:defaultTextStyle>
+  <p:extLst>
+    <p:ext uri="{521415D9-36F7-43E2-AB2F-B90AF26B5E84}">
+      <p14:sectionLst xmlns:p14="http://schemas.microsoft.com/office/powerpoint/2010/main">
+        <p14:section name="Default Section" id="{0AF8DDE9-E3EA-4A8F-9629-4C96F7313161}">
+          <p14:sldIdLst>
+            <p14:sldId id="256"/>
+            <p14:sldId id="259"/>
+            <p14:sldId id="257"/>
+            <p14:sldId id="266"/>
+            <p14:sldId id="267"/>
+          </p14:sldIdLst>
+        </p14:section>
+        <p14:section name="Other" id="{F82D9DB5-9B60-4067-BF9E-2549A84884BD}">
+          <p14:sldIdLst>
+            <p14:sldId id="260"/>
+            <p14:sldId id="261"/>
+            <p14:sldId id="262"/>
+            <p14:sldId id="263"/>
+            <p14:sldId id="264"/>
+            <p14:sldId id="268"/>
+          </p14:sldIdLst>
+        </p14:section>
+        <p14:section name="19.10.2022" id="{26CB833D-00BC-4569-A8DE-A754646A1F60}">
+          <p14:sldIdLst>
+            <p14:sldId id="269"/>
+            <p14:sldId id="270"/>
+            <p14:sldId id="271"/>
+            <p14:sldId id="272"/>
+            <p14:sldId id="273"/>
+          </p14:sldIdLst>
+        </p14:section>
+      </p14:sectionLst>
+    </p:ext>
+    <p:ext uri="{EFAFB233-063F-42B5-8137-9DF3F51BA10A}">
+      <p15:sldGuideLst xmlns:p15="http://schemas.microsoft.com/office/powerpoint/2012/main"/>
+    </p:ext>
+  </p:extLst>
 </p:presentation>
 </file>
 
@@ -261,7 +306,7 @@
           <a:p>
             <a:fld id="{3CCA50DD-E80F-4A10-8379-FAA7C52F806C}" type="datetimeFigureOut">
               <a:rPr lang="en-US" smtClean="0"/>
-              <a:t>10/15/2022</a:t>
+              <a:t>10/21/2022</a:t>
             </a:fld>
             <a:endParaRPr lang="en-US"/>
           </a:p>
@@ -459,7 +504,7 @@
           <a:p>
             <a:fld id="{3CCA50DD-E80F-4A10-8379-FAA7C52F806C}" type="datetimeFigureOut">
               <a:rPr lang="en-US" smtClean="0"/>
-              <a:t>10/15/2022</a:t>
+              <a:t>10/21/2022</a:t>
             </a:fld>
             <a:endParaRPr lang="en-US"/>
           </a:p>
@@ -667,7 +712,7 @@
           <a:p>
             <a:fld id="{3CCA50DD-E80F-4A10-8379-FAA7C52F806C}" type="datetimeFigureOut">
               <a:rPr lang="en-US" smtClean="0"/>
-              <a:t>10/15/2022</a:t>
+              <a:t>10/21/2022</a:t>
             </a:fld>
             <a:endParaRPr lang="en-US"/>
           </a:p>
@@ -865,7 +910,7 @@
           <a:p>
             <a:fld id="{3CCA50DD-E80F-4A10-8379-FAA7C52F806C}" type="datetimeFigureOut">
               <a:rPr lang="en-US" smtClean="0"/>
-              <a:t>10/15/2022</a:t>
+              <a:t>10/21/2022</a:t>
             </a:fld>
             <a:endParaRPr lang="en-US"/>
           </a:p>
@@ -1140,7 +1185,7 @@
           <a:p>
             <a:fld id="{3CCA50DD-E80F-4A10-8379-FAA7C52F806C}" type="datetimeFigureOut">
               <a:rPr lang="en-US" smtClean="0"/>
-              <a:t>10/15/2022</a:t>
+              <a:t>10/21/2022</a:t>
             </a:fld>
             <a:endParaRPr lang="en-US"/>
           </a:p>
@@ -1405,7 +1450,7 @@
           <a:p>
             <a:fld id="{3CCA50DD-E80F-4A10-8379-FAA7C52F806C}" type="datetimeFigureOut">
               <a:rPr lang="en-US" smtClean="0"/>
-              <a:t>10/15/2022</a:t>
+              <a:t>10/21/2022</a:t>
             </a:fld>
             <a:endParaRPr lang="en-US"/>
           </a:p>
@@ -1817,7 +1862,7 @@
           <a:p>
             <a:fld id="{3CCA50DD-E80F-4A10-8379-FAA7C52F806C}" type="datetimeFigureOut">
               <a:rPr lang="en-US" smtClean="0"/>
-              <a:t>10/15/2022</a:t>
+              <a:t>10/21/2022</a:t>
             </a:fld>
             <a:endParaRPr lang="en-US"/>
           </a:p>
@@ -1958,7 +2003,7 @@
           <a:p>
             <a:fld id="{3CCA50DD-E80F-4A10-8379-FAA7C52F806C}" type="datetimeFigureOut">
               <a:rPr lang="en-US" smtClean="0"/>
-              <a:t>10/15/2022</a:t>
+              <a:t>10/21/2022</a:t>
             </a:fld>
             <a:endParaRPr lang="en-US"/>
           </a:p>
@@ -2071,7 +2116,7 @@
           <a:p>
             <a:fld id="{3CCA50DD-E80F-4A10-8379-FAA7C52F806C}" type="datetimeFigureOut">
               <a:rPr lang="en-US" smtClean="0"/>
-              <a:t>10/15/2022</a:t>
+              <a:t>10/21/2022</a:t>
             </a:fld>
             <a:endParaRPr lang="en-US"/>
           </a:p>
@@ -2382,7 +2427,7 @@
           <a:p>
             <a:fld id="{3CCA50DD-E80F-4A10-8379-FAA7C52F806C}" type="datetimeFigureOut">
               <a:rPr lang="en-US" smtClean="0"/>
-              <a:t>10/15/2022</a:t>
+              <a:t>10/21/2022</a:t>
             </a:fld>
             <a:endParaRPr lang="en-US"/>
           </a:p>
@@ -2670,7 +2715,7 @@
           <a:p>
             <a:fld id="{3CCA50DD-E80F-4A10-8379-FAA7C52F806C}" type="datetimeFigureOut">
               <a:rPr lang="en-US" smtClean="0"/>
-              <a:t>10/15/2022</a:t>
+              <a:t>10/21/2022</a:t>
             </a:fld>
             <a:endParaRPr lang="en-US"/>
           </a:p>
@@ -2911,7 +2956,7 @@
           <a:p>
             <a:fld id="{3CCA50DD-E80F-4A10-8379-FAA7C52F806C}" type="datetimeFigureOut">
               <a:rPr lang="en-US" smtClean="0"/>
-              <a:t>10/15/2022</a:t>
+              <a:t>10/21/2022</a:t>
             </a:fld>
             <a:endParaRPr lang="en-US"/>
           </a:p>
@@ -3399,6 +3444,1534 @@
 </p:sld>
 </file>
 
+<file path=ppt/slides/slide10.xml><?xml version="1.0" encoding="utf-8"?>
+<p:sld xmlns:a="http://schemas.openxmlformats.org/drawingml/2006/main" xmlns:r="http://schemas.openxmlformats.org/officeDocument/2006/relationships" xmlns:p="http://schemas.openxmlformats.org/presentationml/2006/main">
+  <p:cSld>
+    <p:spTree>
+      <p:nvGrpSpPr>
+        <p:cNvPr id="1" name=""/>
+        <p:cNvGrpSpPr/>
+        <p:nvPr/>
+      </p:nvGrpSpPr>
+      <p:grpSpPr>
+        <a:xfrm>
+          <a:off x="0" y="0"/>
+          <a:ext cx="0" cy="0"/>
+          <a:chOff x="0" y="0"/>
+          <a:chExt cx="0" cy="0"/>
+        </a:xfrm>
+      </p:grpSpPr>
+      <p:sp>
+        <p:nvSpPr>
+          <p:cNvPr id="2" name="Title 1">
+            <a:extLst>
+              <a:ext uri="{FF2B5EF4-FFF2-40B4-BE49-F238E27FC236}">
+                <a16:creationId xmlns:a16="http://schemas.microsoft.com/office/drawing/2014/main" id="{61F06C22-F136-3D87-EC33-FBF92BBA6D1C}"/>
+              </a:ext>
+            </a:extLst>
+          </p:cNvPr>
+          <p:cNvSpPr>
+            <a:spLocks noGrp="1"/>
+          </p:cNvSpPr>
+          <p:nvPr>
+            <p:ph type="title"/>
+          </p:nvPr>
+        </p:nvSpPr>
+        <p:spPr/>
+        <p:txBody>
+          <a:bodyPr/>
+          <a:lstStyle/>
+          <a:p>
+            <a:r>
+              <a:rPr lang="en-US" dirty="0" err="1"/>
+              <a:t>static_scripts_current_original</a:t>
+            </a:r>
+            <a:endParaRPr lang="en-US" dirty="0"/>
+          </a:p>
+        </p:txBody>
+      </p:sp>
+      <p:pic>
+        <p:nvPicPr>
+          <p:cNvPr id="5" name="Content Placeholder 4">
+            <a:extLst>
+              <a:ext uri="{FF2B5EF4-FFF2-40B4-BE49-F238E27FC236}">
+                <a16:creationId xmlns:a16="http://schemas.microsoft.com/office/drawing/2014/main" id="{809C4B67-0EDB-E69D-1940-9FEB7D026D3C}"/>
+              </a:ext>
+            </a:extLst>
+          </p:cNvPr>
+          <p:cNvPicPr>
+            <a:picLocks noGrp="1" noChangeAspect="1"/>
+          </p:cNvPicPr>
+          <p:nvPr>
+            <p:ph idx="1"/>
+          </p:nvPr>
+        </p:nvPicPr>
+        <p:blipFill>
+          <a:blip r:embed="rId2">
+            <a:extLst>
+              <a:ext uri="{28A0092B-C50C-407E-A947-70E740481C1C}">
+                <a14:useLocalDpi xmlns:a14="http://schemas.microsoft.com/office/drawing/2010/main" val="0"/>
+              </a:ext>
+            </a:extLst>
+          </a:blip>
+          <a:stretch>
+            <a:fillRect/>
+          </a:stretch>
+        </p:blipFill>
+        <p:spPr>
+          <a:xfrm>
+            <a:off x="1767208" y="1825625"/>
+            <a:ext cx="8657584" cy="4351338"/>
+          </a:xfrm>
+        </p:spPr>
+      </p:pic>
+    </p:spTree>
+    <p:extLst>
+      <p:ext uri="{BB962C8B-B14F-4D97-AF65-F5344CB8AC3E}">
+        <p14:creationId xmlns:p14="http://schemas.microsoft.com/office/powerpoint/2010/main" val="1003531755"/>
+      </p:ext>
+    </p:extLst>
+  </p:cSld>
+  <p:clrMapOvr>
+    <a:masterClrMapping/>
+  </p:clrMapOvr>
+</p:sld>
+</file>
+
+<file path=ppt/slides/slide11.xml><?xml version="1.0" encoding="utf-8"?>
+<p:sld xmlns:a="http://schemas.openxmlformats.org/drawingml/2006/main" xmlns:r="http://schemas.openxmlformats.org/officeDocument/2006/relationships" xmlns:p="http://schemas.openxmlformats.org/presentationml/2006/main">
+  <p:cSld>
+    <p:spTree>
+      <p:nvGrpSpPr>
+        <p:cNvPr id="1" name=""/>
+        <p:cNvGrpSpPr/>
+        <p:nvPr/>
+      </p:nvGrpSpPr>
+      <p:grpSpPr>
+        <a:xfrm>
+          <a:off x="0" y="0"/>
+          <a:ext cx="0" cy="0"/>
+          <a:chOff x="0" y="0"/>
+          <a:chExt cx="0" cy="0"/>
+        </a:xfrm>
+      </p:grpSpPr>
+      <p:sp>
+        <p:nvSpPr>
+          <p:cNvPr id="2" name="Title 1">
+            <a:extLst>
+              <a:ext uri="{FF2B5EF4-FFF2-40B4-BE49-F238E27FC236}">
+                <a16:creationId xmlns:a16="http://schemas.microsoft.com/office/drawing/2014/main" id="{61F06C22-F136-3D87-EC33-FBF92BBA6D1C}"/>
+              </a:ext>
+            </a:extLst>
+          </p:cNvPr>
+          <p:cNvSpPr>
+            <a:spLocks noGrp="1"/>
+          </p:cNvSpPr>
+          <p:nvPr>
+            <p:ph type="title"/>
+          </p:nvPr>
+        </p:nvSpPr>
+        <p:spPr/>
+        <p:txBody>
+          <a:bodyPr/>
+          <a:lstStyle/>
+          <a:p>
+            <a:r>
+              <a:rPr lang="en-US" dirty="0" err="1"/>
+              <a:t>static_scripts_current_original</a:t>
+            </a:r>
+            <a:endParaRPr lang="en-US" dirty="0"/>
+          </a:p>
+        </p:txBody>
+      </p:sp>
+      <p:pic>
+        <p:nvPicPr>
+          <p:cNvPr id="9" name="Content Placeholder 8">
+            <a:extLst>
+              <a:ext uri="{FF2B5EF4-FFF2-40B4-BE49-F238E27FC236}">
+                <a16:creationId xmlns:a16="http://schemas.microsoft.com/office/drawing/2014/main" id="{15E14614-F249-A959-92B0-8E154156686E}"/>
+              </a:ext>
+            </a:extLst>
+          </p:cNvPr>
+          <p:cNvPicPr>
+            <a:picLocks noGrp="1" noChangeAspect="1"/>
+          </p:cNvPicPr>
+          <p:nvPr>
+            <p:ph idx="1"/>
+          </p:nvPr>
+        </p:nvPicPr>
+        <p:blipFill>
+          <a:blip r:embed="rId2"/>
+          <a:stretch>
+            <a:fillRect/>
+          </a:stretch>
+        </p:blipFill>
+        <p:spPr>
+          <a:xfrm>
+            <a:off x="176831" y="1907687"/>
+            <a:ext cx="6176092" cy="4351338"/>
+          </a:xfrm>
+        </p:spPr>
+      </p:pic>
+      <p:pic>
+        <p:nvPicPr>
+          <p:cNvPr id="12" name="Picture 11">
+            <a:extLst>
+              <a:ext uri="{FF2B5EF4-FFF2-40B4-BE49-F238E27FC236}">
+                <a16:creationId xmlns:a16="http://schemas.microsoft.com/office/drawing/2014/main" id="{5618DB61-5AA7-FD1D-A2C4-A0202C61A93E}"/>
+              </a:ext>
+            </a:extLst>
+          </p:cNvPr>
+          <p:cNvPicPr>
+            <a:picLocks noChangeAspect="1"/>
+          </p:cNvPicPr>
+          <p:nvPr/>
+        </p:nvPicPr>
+        <p:blipFill>
+          <a:blip r:embed="rId3"/>
+          <a:stretch>
+            <a:fillRect/>
+          </a:stretch>
+        </p:blipFill>
+        <p:spPr>
+          <a:xfrm>
+            <a:off x="6804267" y="1230947"/>
+            <a:ext cx="5210902" cy="4906060"/>
+          </a:xfrm>
+          <a:prstGeom prst="rect">
+            <a:avLst/>
+          </a:prstGeom>
+        </p:spPr>
+      </p:pic>
+    </p:spTree>
+    <p:extLst>
+      <p:ext uri="{BB962C8B-B14F-4D97-AF65-F5344CB8AC3E}">
+        <p14:creationId xmlns:p14="http://schemas.microsoft.com/office/powerpoint/2010/main" val="180832490"/>
+      </p:ext>
+    </p:extLst>
+  </p:cSld>
+  <p:clrMapOvr>
+    <a:masterClrMapping/>
+  </p:clrMapOvr>
+</p:sld>
+</file>
+
+<file path=ppt/slides/slide12.xml><?xml version="1.0" encoding="utf-8"?>
+<p:sld xmlns:a="http://schemas.openxmlformats.org/drawingml/2006/main" xmlns:r="http://schemas.openxmlformats.org/officeDocument/2006/relationships" xmlns:p="http://schemas.openxmlformats.org/presentationml/2006/main">
+  <p:cSld>
+    <p:spTree>
+      <p:nvGrpSpPr>
+        <p:cNvPr id="1" name=""/>
+        <p:cNvGrpSpPr/>
+        <p:nvPr/>
+      </p:nvGrpSpPr>
+      <p:grpSpPr>
+        <a:xfrm>
+          <a:off x="0" y="0"/>
+          <a:ext cx="0" cy="0"/>
+          <a:chOff x="0" y="0"/>
+          <a:chExt cx="0" cy="0"/>
+        </a:xfrm>
+      </p:grpSpPr>
+      <p:sp>
+        <p:nvSpPr>
+          <p:cNvPr id="2" name="Title 1">
+            <a:extLst>
+              <a:ext uri="{FF2B5EF4-FFF2-40B4-BE49-F238E27FC236}">
+                <a16:creationId xmlns:a16="http://schemas.microsoft.com/office/drawing/2014/main" id="{22019C7E-90B8-94A7-5156-A33BC9F5F2CA}"/>
+              </a:ext>
+            </a:extLst>
+          </p:cNvPr>
+          <p:cNvSpPr>
+            <a:spLocks noGrp="1"/>
+          </p:cNvSpPr>
+          <p:nvPr>
+            <p:ph type="title"/>
+          </p:nvPr>
+        </p:nvSpPr>
+        <p:spPr/>
+        <p:txBody>
+          <a:bodyPr>
+            <a:normAutofit fontScale="90000"/>
+          </a:bodyPr>
+          <a:lstStyle/>
+          <a:p>
+            <a:r>
+              <a:rPr lang="en-US" dirty="0"/>
+              <a:t>Comparison between Python parsing of Boulder data and Octave parsing of Boulder data. Variable = </a:t>
+            </a:r>
+            <a:r>
+              <a:rPr lang="en-US" dirty="0" err="1"/>
+              <a:t>verr</a:t>
+            </a:r>
+            <a:endParaRPr lang="en-US" dirty="0"/>
+          </a:p>
+        </p:txBody>
+      </p:sp>
+      <p:pic>
+        <p:nvPicPr>
+          <p:cNvPr id="5" name="Content Placeholder 4">
+            <a:extLst>
+              <a:ext uri="{FF2B5EF4-FFF2-40B4-BE49-F238E27FC236}">
+                <a16:creationId xmlns:a16="http://schemas.microsoft.com/office/drawing/2014/main" id="{898F9FE1-D5A8-5D01-179E-9849D41F8EBC}"/>
+              </a:ext>
+            </a:extLst>
+          </p:cNvPr>
+          <p:cNvPicPr>
+            <a:picLocks noGrp="1" noChangeAspect="1"/>
+          </p:cNvPicPr>
+          <p:nvPr>
+            <p:ph idx="1"/>
+          </p:nvPr>
+        </p:nvPicPr>
+        <p:blipFill>
+          <a:blip r:embed="rId2"/>
+          <a:stretch>
+            <a:fillRect/>
+          </a:stretch>
+        </p:blipFill>
+        <p:spPr>
+          <a:xfrm>
+            <a:off x="1275821" y="1825625"/>
+            <a:ext cx="9640358" cy="4351338"/>
+          </a:xfrm>
+        </p:spPr>
+      </p:pic>
+    </p:spTree>
+    <p:extLst>
+      <p:ext uri="{BB962C8B-B14F-4D97-AF65-F5344CB8AC3E}">
+        <p14:creationId xmlns:p14="http://schemas.microsoft.com/office/powerpoint/2010/main" val="3481828150"/>
+      </p:ext>
+    </p:extLst>
+  </p:cSld>
+  <p:clrMapOvr>
+    <a:masterClrMapping/>
+  </p:clrMapOvr>
+</p:sld>
+</file>
+
+<file path=ppt/slides/slide13.xml><?xml version="1.0" encoding="utf-8"?>
+<p:sld xmlns:a="http://schemas.openxmlformats.org/drawingml/2006/main" xmlns:r="http://schemas.openxmlformats.org/officeDocument/2006/relationships" xmlns:p="http://schemas.openxmlformats.org/presentationml/2006/main">
+  <p:cSld>
+    <p:spTree>
+      <p:nvGrpSpPr>
+        <p:cNvPr id="1" name=""/>
+        <p:cNvGrpSpPr/>
+        <p:nvPr/>
+      </p:nvGrpSpPr>
+      <p:grpSpPr>
+        <a:xfrm>
+          <a:off x="0" y="0"/>
+          <a:ext cx="0" cy="0"/>
+          <a:chOff x="0" y="0"/>
+          <a:chExt cx="0" cy="0"/>
+        </a:xfrm>
+      </p:grpSpPr>
+      <p:sp>
+        <p:nvSpPr>
+          <p:cNvPr id="2" name="Title 1">
+            <a:extLst>
+              <a:ext uri="{FF2B5EF4-FFF2-40B4-BE49-F238E27FC236}">
+                <a16:creationId xmlns:a16="http://schemas.microsoft.com/office/drawing/2014/main" id="{22019C7E-90B8-94A7-5156-A33BC9F5F2CA}"/>
+              </a:ext>
+            </a:extLst>
+          </p:cNvPr>
+          <p:cNvSpPr>
+            <a:spLocks noGrp="1"/>
+          </p:cNvSpPr>
+          <p:nvPr>
+            <p:ph type="title"/>
+          </p:nvPr>
+        </p:nvSpPr>
+        <p:spPr>
+          <a:xfrm>
+            <a:off x="838200" y="857494"/>
+            <a:ext cx="10515600" cy="1325563"/>
+          </a:xfrm>
+        </p:spPr>
+        <p:txBody>
+          <a:bodyPr>
+            <a:normAutofit fontScale="90000"/>
+          </a:bodyPr>
+          <a:lstStyle/>
+          <a:p>
+            <a:r>
+              <a:rPr lang="en-US" dirty="0"/>
+              <a:t>Boulder data looks better with this change: if abs(script_1_current[k]) &lt; </a:t>
+            </a:r>
+            <a:r>
+              <a:rPr lang="en-US" dirty="0" err="1"/>
+              <a:t>current_sign_threshold</a:t>
+            </a:r>
+            <a:r>
+              <a:rPr lang="en-US" dirty="0"/>
+              <a:t>: where the threshold is now 1e-8 instead of Q/100.</a:t>
+            </a:r>
+            <a:br>
+              <a:rPr lang="en-US" dirty="0"/>
+            </a:br>
+            <a:r>
+              <a:rPr lang="en-US" dirty="0"/>
+              <a:t>Specifically, M0 has nonnegative values</a:t>
+            </a:r>
+          </a:p>
+        </p:txBody>
+      </p:sp>
+      <p:pic>
+        <p:nvPicPr>
+          <p:cNvPr id="7" name="Content Placeholder 6">
+            <a:extLst>
+              <a:ext uri="{FF2B5EF4-FFF2-40B4-BE49-F238E27FC236}">
+                <a16:creationId xmlns:a16="http://schemas.microsoft.com/office/drawing/2014/main" id="{B22B553D-25B2-3A08-07B9-689CE3C1F074}"/>
+              </a:ext>
+            </a:extLst>
+          </p:cNvPr>
+          <p:cNvPicPr>
+            <a:picLocks noGrp="1" noChangeAspect="1"/>
+          </p:cNvPicPr>
+          <p:nvPr>
+            <p:ph idx="1"/>
+          </p:nvPr>
+        </p:nvPicPr>
+        <p:blipFill>
+          <a:blip r:embed="rId2"/>
+          <a:stretch>
+            <a:fillRect/>
+          </a:stretch>
+        </p:blipFill>
+        <p:spPr>
+          <a:xfrm>
+            <a:off x="1362164" y="2895047"/>
+            <a:ext cx="9221487" cy="3962953"/>
+          </a:xfrm>
+        </p:spPr>
+      </p:pic>
+    </p:spTree>
+    <p:extLst>
+      <p:ext uri="{BB962C8B-B14F-4D97-AF65-F5344CB8AC3E}">
+        <p14:creationId xmlns:p14="http://schemas.microsoft.com/office/powerpoint/2010/main" val="699684215"/>
+      </p:ext>
+    </p:extLst>
+  </p:cSld>
+  <p:clrMapOvr>
+    <a:masterClrMapping/>
+  </p:clrMapOvr>
+</p:sld>
+</file>
+
+<file path=ppt/slides/slide14.xml><?xml version="1.0" encoding="utf-8"?>
+<p:sld xmlns:a="http://schemas.openxmlformats.org/drawingml/2006/main" xmlns:r="http://schemas.openxmlformats.org/officeDocument/2006/relationships" xmlns:p="http://schemas.openxmlformats.org/presentationml/2006/main">
+  <p:cSld>
+    <p:spTree>
+      <p:nvGrpSpPr>
+        <p:cNvPr id="1" name=""/>
+        <p:cNvGrpSpPr/>
+        <p:nvPr/>
+      </p:nvGrpSpPr>
+      <p:grpSpPr>
+        <a:xfrm>
+          <a:off x="0" y="0"/>
+          <a:ext cx="0" cy="0"/>
+          <a:chOff x="0" y="0"/>
+          <a:chExt cx="0" cy="0"/>
+        </a:xfrm>
+      </p:grpSpPr>
+      <p:sp>
+        <p:nvSpPr>
+          <p:cNvPr id="2" name="Title 1">
+            <a:extLst>
+              <a:ext uri="{FF2B5EF4-FFF2-40B4-BE49-F238E27FC236}">
+                <a16:creationId xmlns:a16="http://schemas.microsoft.com/office/drawing/2014/main" id="{22019C7E-90B8-94A7-5156-A33BC9F5F2CA}"/>
+              </a:ext>
+            </a:extLst>
+          </p:cNvPr>
+          <p:cNvSpPr>
+            <a:spLocks noGrp="1"/>
+          </p:cNvSpPr>
+          <p:nvPr>
+            <p:ph type="title"/>
+          </p:nvPr>
+        </p:nvSpPr>
+        <p:spPr>
+          <a:xfrm>
+            <a:off x="838200" y="857494"/>
+            <a:ext cx="10515600" cy="1325563"/>
+          </a:xfrm>
+        </p:spPr>
+        <p:txBody>
+          <a:bodyPr>
+            <a:normAutofit/>
+          </a:bodyPr>
+          <a:lstStyle/>
+          <a:p>
+            <a:r>
+              <a:rPr lang="en-US" dirty="0"/>
+              <a:t>No hysteresis typhoon data. I used the newly updated hysteresis behavior.</a:t>
+            </a:r>
+          </a:p>
+        </p:txBody>
+      </p:sp>
+      <p:pic>
+        <p:nvPicPr>
+          <p:cNvPr id="9" name="Content Placeholder 8">
+            <a:extLst>
+              <a:ext uri="{FF2B5EF4-FFF2-40B4-BE49-F238E27FC236}">
+                <a16:creationId xmlns:a16="http://schemas.microsoft.com/office/drawing/2014/main" id="{A8D73BE8-A0B1-944C-65F3-08B2B4E174E0}"/>
+              </a:ext>
+            </a:extLst>
+          </p:cNvPr>
+          <p:cNvPicPr>
+            <a:picLocks noGrp="1" noChangeAspect="1"/>
+          </p:cNvPicPr>
+          <p:nvPr>
+            <p:ph idx="1"/>
+          </p:nvPr>
+        </p:nvPicPr>
+        <p:blipFill>
+          <a:blip r:embed="rId2"/>
+          <a:stretch>
+            <a:fillRect/>
+          </a:stretch>
+        </p:blipFill>
+        <p:spPr>
+          <a:xfrm>
+            <a:off x="598759" y="2183057"/>
+            <a:ext cx="8638144" cy="4351338"/>
+          </a:xfrm>
+        </p:spPr>
+      </p:pic>
+      <p:sp>
+        <p:nvSpPr>
+          <p:cNvPr id="10" name="Content Placeholder 2">
+            <a:extLst>
+              <a:ext uri="{FF2B5EF4-FFF2-40B4-BE49-F238E27FC236}">
+                <a16:creationId xmlns:a16="http://schemas.microsoft.com/office/drawing/2014/main" id="{FEB48DA9-CC05-AC51-AF21-ECBA3B2B42DB}"/>
+              </a:ext>
+            </a:extLst>
+          </p:cNvPr>
+          <p:cNvSpPr txBox="1">
+            <a:spLocks/>
+          </p:cNvSpPr>
+          <p:nvPr/>
+        </p:nvSpPr>
+        <p:spPr>
+          <a:xfrm>
+            <a:off x="9476344" y="2144443"/>
+            <a:ext cx="3751385" cy="4428565"/>
+          </a:xfrm>
+          <a:prstGeom prst="rect">
+            <a:avLst/>
+          </a:prstGeom>
+        </p:spPr>
+        <p:txBody>
+          <a:bodyPr vert="horz" lIns="91440" tIns="45720" rIns="91440" bIns="45720" rtlCol="0">
+            <a:normAutofit/>
+          </a:bodyPr>
+          <a:lstStyle>
+            <a:lvl1pPr marL="228600" indent="-228600" algn="l" defTabSz="914400" rtl="0" eaLnBrk="1" latinLnBrk="0" hangingPunct="1">
+              <a:lnSpc>
+                <a:spcPct val="90000"/>
+              </a:lnSpc>
+              <a:spcBef>
+                <a:spcPts val="1000"/>
+              </a:spcBef>
+              <a:buFont typeface="Arial" panose="020B0604020202020204" pitchFamily="34" charset="0"/>
+              <a:buChar char="•"/>
+              <a:defRPr sz="2800" kern="1200">
+                <a:solidFill>
+                  <a:schemeClr val="tx1"/>
+                </a:solidFill>
+                <a:latin typeface="+mn-lt"/>
+                <a:ea typeface="+mn-ea"/>
+                <a:cs typeface="+mn-cs"/>
+              </a:defRPr>
+            </a:lvl1pPr>
+            <a:lvl2pPr marL="685800" indent="-228600" algn="l" defTabSz="914400" rtl="0" eaLnBrk="1" latinLnBrk="0" hangingPunct="1">
+              <a:lnSpc>
+                <a:spcPct val="90000"/>
+              </a:lnSpc>
+              <a:spcBef>
+                <a:spcPts val="500"/>
+              </a:spcBef>
+              <a:buFont typeface="Arial" panose="020B0604020202020204" pitchFamily="34" charset="0"/>
+              <a:buChar char="•"/>
+              <a:defRPr sz="2400" kern="1200">
+                <a:solidFill>
+                  <a:schemeClr val="tx1"/>
+                </a:solidFill>
+                <a:latin typeface="+mn-lt"/>
+                <a:ea typeface="+mn-ea"/>
+                <a:cs typeface="+mn-cs"/>
+              </a:defRPr>
+            </a:lvl2pPr>
+            <a:lvl3pPr marL="1143000" indent="-228600" algn="l" defTabSz="914400" rtl="0" eaLnBrk="1" latinLnBrk="0" hangingPunct="1">
+              <a:lnSpc>
+                <a:spcPct val="90000"/>
+              </a:lnSpc>
+              <a:spcBef>
+                <a:spcPts val="500"/>
+              </a:spcBef>
+              <a:buFont typeface="Arial" panose="020B0604020202020204" pitchFamily="34" charset="0"/>
+              <a:buChar char="•"/>
+              <a:defRPr sz="2000" kern="1200">
+                <a:solidFill>
+                  <a:schemeClr val="tx1"/>
+                </a:solidFill>
+                <a:latin typeface="+mn-lt"/>
+                <a:ea typeface="+mn-ea"/>
+                <a:cs typeface="+mn-cs"/>
+              </a:defRPr>
+            </a:lvl3pPr>
+            <a:lvl4pPr marL="1600200" indent="-228600" algn="l" defTabSz="914400" rtl="0" eaLnBrk="1" latinLnBrk="0" hangingPunct="1">
+              <a:lnSpc>
+                <a:spcPct val="90000"/>
+              </a:lnSpc>
+              <a:spcBef>
+                <a:spcPts val="500"/>
+              </a:spcBef>
+              <a:buFont typeface="Arial" panose="020B0604020202020204" pitchFamily="34" charset="0"/>
+              <a:buChar char="•"/>
+              <a:defRPr sz="1800" kern="1200">
+                <a:solidFill>
+                  <a:schemeClr val="tx1"/>
+                </a:solidFill>
+                <a:latin typeface="+mn-lt"/>
+                <a:ea typeface="+mn-ea"/>
+                <a:cs typeface="+mn-cs"/>
+              </a:defRPr>
+            </a:lvl4pPr>
+            <a:lvl5pPr marL="2057400" indent="-228600" algn="l" defTabSz="914400" rtl="0" eaLnBrk="1" latinLnBrk="0" hangingPunct="1">
+              <a:lnSpc>
+                <a:spcPct val="90000"/>
+              </a:lnSpc>
+              <a:spcBef>
+                <a:spcPts val="500"/>
+              </a:spcBef>
+              <a:buFont typeface="Arial" panose="020B0604020202020204" pitchFamily="34" charset="0"/>
+              <a:buChar char="•"/>
+              <a:defRPr sz="1800" kern="1200">
+                <a:solidFill>
+                  <a:schemeClr val="tx1"/>
+                </a:solidFill>
+                <a:latin typeface="+mn-lt"/>
+                <a:ea typeface="+mn-ea"/>
+                <a:cs typeface="+mn-cs"/>
+              </a:defRPr>
+            </a:lvl5pPr>
+            <a:lvl6pPr marL="2514600" indent="-228600" algn="l" defTabSz="914400" rtl="0" eaLnBrk="1" latinLnBrk="0" hangingPunct="1">
+              <a:lnSpc>
+                <a:spcPct val="90000"/>
+              </a:lnSpc>
+              <a:spcBef>
+                <a:spcPts val="500"/>
+              </a:spcBef>
+              <a:buFont typeface="Arial" panose="020B0604020202020204" pitchFamily="34" charset="0"/>
+              <a:buChar char="•"/>
+              <a:defRPr sz="1800" kern="1200">
+                <a:solidFill>
+                  <a:schemeClr val="tx1"/>
+                </a:solidFill>
+                <a:latin typeface="+mn-lt"/>
+                <a:ea typeface="+mn-ea"/>
+                <a:cs typeface="+mn-cs"/>
+              </a:defRPr>
+            </a:lvl6pPr>
+            <a:lvl7pPr marL="2971800" indent="-228600" algn="l" defTabSz="914400" rtl="0" eaLnBrk="1" latinLnBrk="0" hangingPunct="1">
+              <a:lnSpc>
+                <a:spcPct val="90000"/>
+              </a:lnSpc>
+              <a:spcBef>
+                <a:spcPts val="500"/>
+              </a:spcBef>
+              <a:buFont typeface="Arial" panose="020B0604020202020204" pitchFamily="34" charset="0"/>
+              <a:buChar char="•"/>
+              <a:defRPr sz="1800" kern="1200">
+                <a:solidFill>
+                  <a:schemeClr val="tx1"/>
+                </a:solidFill>
+                <a:latin typeface="+mn-lt"/>
+                <a:ea typeface="+mn-ea"/>
+                <a:cs typeface="+mn-cs"/>
+              </a:defRPr>
+            </a:lvl7pPr>
+            <a:lvl8pPr marL="3429000" indent="-228600" algn="l" defTabSz="914400" rtl="0" eaLnBrk="1" latinLnBrk="0" hangingPunct="1">
+              <a:lnSpc>
+                <a:spcPct val="90000"/>
+              </a:lnSpc>
+              <a:spcBef>
+                <a:spcPts val="500"/>
+              </a:spcBef>
+              <a:buFont typeface="Arial" panose="020B0604020202020204" pitchFamily="34" charset="0"/>
+              <a:buChar char="•"/>
+              <a:defRPr sz="1800" kern="1200">
+                <a:solidFill>
+                  <a:schemeClr val="tx1"/>
+                </a:solidFill>
+                <a:latin typeface="+mn-lt"/>
+                <a:ea typeface="+mn-ea"/>
+                <a:cs typeface="+mn-cs"/>
+              </a:defRPr>
+            </a:lvl8pPr>
+            <a:lvl9pPr marL="3886200" indent="-228600" algn="l" defTabSz="914400" rtl="0" eaLnBrk="1" latinLnBrk="0" hangingPunct="1">
+              <a:lnSpc>
+                <a:spcPct val="90000"/>
+              </a:lnSpc>
+              <a:spcBef>
+                <a:spcPts val="500"/>
+              </a:spcBef>
+              <a:buFont typeface="Arial" panose="020B0604020202020204" pitchFamily="34" charset="0"/>
+              <a:buChar char="•"/>
+              <a:defRPr sz="1800" kern="1200">
+                <a:solidFill>
+                  <a:schemeClr val="tx1"/>
+                </a:solidFill>
+                <a:latin typeface="+mn-lt"/>
+                <a:ea typeface="+mn-ea"/>
+                <a:cs typeface="+mn-cs"/>
+              </a:defRPr>
+            </a:lvl9pPr>
+          </a:lstStyle>
+          <a:p>
+            <a:r>
+              <a:rPr lang="en-US" sz="1600" dirty="0"/>
+              <a:t>THEIR RESULTS IN OCTAVE</a:t>
+            </a:r>
+          </a:p>
+          <a:p>
+            <a:r>
+              <a:rPr lang="en-US" sz="1600" dirty="0"/>
+              <a:t>R0 = [4.6198e-3, 1.7810e-3, 1.1351e-3]</a:t>
+            </a:r>
+          </a:p>
+          <a:p>
+            <a:r>
+              <a:rPr lang="en-US" sz="1600" dirty="0"/>
+              <a:t>Eta = [0.98174, 0.99102, 0.98965]</a:t>
+            </a:r>
+          </a:p>
+          <a:p>
+            <a:r>
+              <a:rPr lang="en-US" sz="1600" dirty="0" err="1"/>
+              <a:t>Qparam</a:t>
+            </a:r>
+            <a:r>
+              <a:rPr lang="en-US" sz="1600" dirty="0"/>
+              <a:t> = [14.592, 14.532, 14.444]</a:t>
+            </a:r>
+          </a:p>
+          <a:p>
+            <a:r>
+              <a:rPr lang="en-US" sz="1600" dirty="0" err="1"/>
+              <a:t>Rparam</a:t>
+            </a:r>
+            <a:r>
+              <a:rPr lang="en-US" sz="1600" dirty="0"/>
+              <a:t> = [0.0008368, 0.64769e-3, 0.000535]</a:t>
+            </a:r>
+          </a:p>
+          <a:p>
+            <a:r>
+              <a:rPr lang="en-US" sz="1600" dirty="0" err="1"/>
+              <a:t>Rcparam</a:t>
+            </a:r>
+            <a:r>
+              <a:rPr lang="en-US" sz="1600" dirty="0"/>
+              <a:t> = [2.3844, 5.1555, 4.2939]</a:t>
+            </a:r>
+          </a:p>
+          <a:p>
+            <a:r>
+              <a:rPr lang="en-US" sz="1600" dirty="0" err="1"/>
+              <a:t>Cparam</a:t>
+            </a:r>
+            <a:r>
+              <a:rPr lang="en-US" sz="1600" dirty="0"/>
+              <a:t> = 7.9598e3</a:t>
+            </a:r>
+          </a:p>
+          <a:p>
+            <a:r>
+              <a:rPr lang="en-US" sz="1600" dirty="0"/>
+              <a:t>M0Param = [0.0031315, 0.0023535, 0.0011502]</a:t>
+            </a:r>
+          </a:p>
+          <a:p>
+            <a:r>
+              <a:rPr lang="en-US" sz="1600" dirty="0" err="1"/>
+              <a:t>Mparam</a:t>
+            </a:r>
+            <a:r>
+              <a:rPr lang="en-US" sz="1600" dirty="0"/>
+              <a:t> = [0.039929, 0.020018, 0.020545]</a:t>
+            </a:r>
+          </a:p>
+          <a:p>
+            <a:r>
+              <a:rPr lang="en-US" sz="1600" dirty="0" err="1"/>
+              <a:t>Gparam</a:t>
+            </a:r>
+            <a:r>
+              <a:rPr lang="en-US" sz="1600" dirty="0"/>
+              <a:t> = [67.207, 92.645, 67.840]</a:t>
+            </a:r>
+          </a:p>
+        </p:txBody>
+      </p:sp>
+    </p:spTree>
+    <p:extLst>
+      <p:ext uri="{BB962C8B-B14F-4D97-AF65-F5344CB8AC3E}">
+        <p14:creationId xmlns:p14="http://schemas.microsoft.com/office/powerpoint/2010/main" val="4101271133"/>
+      </p:ext>
+    </p:extLst>
+  </p:cSld>
+  <p:clrMapOvr>
+    <a:masterClrMapping/>
+  </p:clrMapOvr>
+</p:sld>
+</file>
+
+<file path=ppt/slides/slide15.xml><?xml version="1.0" encoding="utf-8"?>
+<p:sld xmlns:a="http://schemas.openxmlformats.org/drawingml/2006/main" xmlns:r="http://schemas.openxmlformats.org/officeDocument/2006/relationships" xmlns:p="http://schemas.openxmlformats.org/presentationml/2006/main">
+  <p:cSld>
+    <p:spTree>
+      <p:nvGrpSpPr>
+        <p:cNvPr id="1" name=""/>
+        <p:cNvGrpSpPr/>
+        <p:nvPr/>
+      </p:nvGrpSpPr>
+      <p:grpSpPr>
+        <a:xfrm>
+          <a:off x="0" y="0"/>
+          <a:ext cx="0" cy="0"/>
+          <a:chOff x="0" y="0"/>
+          <a:chExt cx="0" cy="0"/>
+        </a:xfrm>
+      </p:grpSpPr>
+      <p:sp>
+        <p:nvSpPr>
+          <p:cNvPr id="2" name="Title 1">
+            <a:extLst>
+              <a:ext uri="{FF2B5EF4-FFF2-40B4-BE49-F238E27FC236}">
+                <a16:creationId xmlns:a16="http://schemas.microsoft.com/office/drawing/2014/main" id="{22019C7E-90B8-94A7-5156-A33BC9F5F2CA}"/>
+              </a:ext>
+            </a:extLst>
+          </p:cNvPr>
+          <p:cNvSpPr>
+            <a:spLocks noGrp="1"/>
+          </p:cNvSpPr>
+          <p:nvPr>
+            <p:ph type="title"/>
+          </p:nvPr>
+        </p:nvSpPr>
+        <p:spPr>
+          <a:xfrm>
+            <a:off x="598759" y="74979"/>
+            <a:ext cx="10515600" cy="1325563"/>
+          </a:xfrm>
+        </p:spPr>
+        <p:txBody>
+          <a:bodyPr>
+            <a:normAutofit/>
+          </a:bodyPr>
+          <a:lstStyle/>
+          <a:p>
+            <a:r>
+              <a:rPr lang="en-US" dirty="0"/>
+              <a:t>No hysteresis, no RC, FULL VHIL typhoon data.</a:t>
+            </a:r>
+          </a:p>
+        </p:txBody>
+      </p:sp>
+      <p:sp>
+        <p:nvSpPr>
+          <p:cNvPr id="10" name="Content Placeholder 2">
+            <a:extLst>
+              <a:ext uri="{FF2B5EF4-FFF2-40B4-BE49-F238E27FC236}">
+                <a16:creationId xmlns:a16="http://schemas.microsoft.com/office/drawing/2014/main" id="{FEB48DA9-CC05-AC51-AF21-ECBA3B2B42DB}"/>
+              </a:ext>
+            </a:extLst>
+          </p:cNvPr>
+          <p:cNvSpPr txBox="1">
+            <a:spLocks/>
+          </p:cNvSpPr>
+          <p:nvPr/>
+        </p:nvSpPr>
+        <p:spPr>
+          <a:xfrm>
+            <a:off x="9476344" y="2144443"/>
+            <a:ext cx="3751385" cy="4428565"/>
+          </a:xfrm>
+          <a:prstGeom prst="rect">
+            <a:avLst/>
+          </a:prstGeom>
+        </p:spPr>
+        <p:txBody>
+          <a:bodyPr vert="horz" lIns="91440" tIns="45720" rIns="91440" bIns="45720" rtlCol="0">
+            <a:normAutofit/>
+          </a:bodyPr>
+          <a:lstStyle>
+            <a:lvl1pPr marL="228600" indent="-228600" algn="l" defTabSz="914400" rtl="0" eaLnBrk="1" latinLnBrk="0" hangingPunct="1">
+              <a:lnSpc>
+                <a:spcPct val="90000"/>
+              </a:lnSpc>
+              <a:spcBef>
+                <a:spcPts val="1000"/>
+              </a:spcBef>
+              <a:buFont typeface="Arial" panose="020B0604020202020204" pitchFamily="34" charset="0"/>
+              <a:buChar char="•"/>
+              <a:defRPr sz="2800" kern="1200">
+                <a:solidFill>
+                  <a:schemeClr val="tx1"/>
+                </a:solidFill>
+                <a:latin typeface="+mn-lt"/>
+                <a:ea typeface="+mn-ea"/>
+                <a:cs typeface="+mn-cs"/>
+              </a:defRPr>
+            </a:lvl1pPr>
+            <a:lvl2pPr marL="685800" indent="-228600" algn="l" defTabSz="914400" rtl="0" eaLnBrk="1" latinLnBrk="0" hangingPunct="1">
+              <a:lnSpc>
+                <a:spcPct val="90000"/>
+              </a:lnSpc>
+              <a:spcBef>
+                <a:spcPts val="500"/>
+              </a:spcBef>
+              <a:buFont typeface="Arial" panose="020B0604020202020204" pitchFamily="34" charset="0"/>
+              <a:buChar char="•"/>
+              <a:defRPr sz="2400" kern="1200">
+                <a:solidFill>
+                  <a:schemeClr val="tx1"/>
+                </a:solidFill>
+                <a:latin typeface="+mn-lt"/>
+                <a:ea typeface="+mn-ea"/>
+                <a:cs typeface="+mn-cs"/>
+              </a:defRPr>
+            </a:lvl2pPr>
+            <a:lvl3pPr marL="1143000" indent="-228600" algn="l" defTabSz="914400" rtl="0" eaLnBrk="1" latinLnBrk="0" hangingPunct="1">
+              <a:lnSpc>
+                <a:spcPct val="90000"/>
+              </a:lnSpc>
+              <a:spcBef>
+                <a:spcPts val="500"/>
+              </a:spcBef>
+              <a:buFont typeface="Arial" panose="020B0604020202020204" pitchFamily="34" charset="0"/>
+              <a:buChar char="•"/>
+              <a:defRPr sz="2000" kern="1200">
+                <a:solidFill>
+                  <a:schemeClr val="tx1"/>
+                </a:solidFill>
+                <a:latin typeface="+mn-lt"/>
+                <a:ea typeface="+mn-ea"/>
+                <a:cs typeface="+mn-cs"/>
+              </a:defRPr>
+            </a:lvl3pPr>
+            <a:lvl4pPr marL="1600200" indent="-228600" algn="l" defTabSz="914400" rtl="0" eaLnBrk="1" latinLnBrk="0" hangingPunct="1">
+              <a:lnSpc>
+                <a:spcPct val="90000"/>
+              </a:lnSpc>
+              <a:spcBef>
+                <a:spcPts val="500"/>
+              </a:spcBef>
+              <a:buFont typeface="Arial" panose="020B0604020202020204" pitchFamily="34" charset="0"/>
+              <a:buChar char="•"/>
+              <a:defRPr sz="1800" kern="1200">
+                <a:solidFill>
+                  <a:schemeClr val="tx1"/>
+                </a:solidFill>
+                <a:latin typeface="+mn-lt"/>
+                <a:ea typeface="+mn-ea"/>
+                <a:cs typeface="+mn-cs"/>
+              </a:defRPr>
+            </a:lvl4pPr>
+            <a:lvl5pPr marL="2057400" indent="-228600" algn="l" defTabSz="914400" rtl="0" eaLnBrk="1" latinLnBrk="0" hangingPunct="1">
+              <a:lnSpc>
+                <a:spcPct val="90000"/>
+              </a:lnSpc>
+              <a:spcBef>
+                <a:spcPts val="500"/>
+              </a:spcBef>
+              <a:buFont typeface="Arial" panose="020B0604020202020204" pitchFamily="34" charset="0"/>
+              <a:buChar char="•"/>
+              <a:defRPr sz="1800" kern="1200">
+                <a:solidFill>
+                  <a:schemeClr val="tx1"/>
+                </a:solidFill>
+                <a:latin typeface="+mn-lt"/>
+                <a:ea typeface="+mn-ea"/>
+                <a:cs typeface="+mn-cs"/>
+              </a:defRPr>
+            </a:lvl5pPr>
+            <a:lvl6pPr marL="2514600" indent="-228600" algn="l" defTabSz="914400" rtl="0" eaLnBrk="1" latinLnBrk="0" hangingPunct="1">
+              <a:lnSpc>
+                <a:spcPct val="90000"/>
+              </a:lnSpc>
+              <a:spcBef>
+                <a:spcPts val="500"/>
+              </a:spcBef>
+              <a:buFont typeface="Arial" panose="020B0604020202020204" pitchFamily="34" charset="0"/>
+              <a:buChar char="•"/>
+              <a:defRPr sz="1800" kern="1200">
+                <a:solidFill>
+                  <a:schemeClr val="tx1"/>
+                </a:solidFill>
+                <a:latin typeface="+mn-lt"/>
+                <a:ea typeface="+mn-ea"/>
+                <a:cs typeface="+mn-cs"/>
+              </a:defRPr>
+            </a:lvl6pPr>
+            <a:lvl7pPr marL="2971800" indent="-228600" algn="l" defTabSz="914400" rtl="0" eaLnBrk="1" latinLnBrk="0" hangingPunct="1">
+              <a:lnSpc>
+                <a:spcPct val="90000"/>
+              </a:lnSpc>
+              <a:spcBef>
+                <a:spcPts val="500"/>
+              </a:spcBef>
+              <a:buFont typeface="Arial" panose="020B0604020202020204" pitchFamily="34" charset="0"/>
+              <a:buChar char="•"/>
+              <a:defRPr sz="1800" kern="1200">
+                <a:solidFill>
+                  <a:schemeClr val="tx1"/>
+                </a:solidFill>
+                <a:latin typeface="+mn-lt"/>
+                <a:ea typeface="+mn-ea"/>
+                <a:cs typeface="+mn-cs"/>
+              </a:defRPr>
+            </a:lvl7pPr>
+            <a:lvl8pPr marL="3429000" indent="-228600" algn="l" defTabSz="914400" rtl="0" eaLnBrk="1" latinLnBrk="0" hangingPunct="1">
+              <a:lnSpc>
+                <a:spcPct val="90000"/>
+              </a:lnSpc>
+              <a:spcBef>
+                <a:spcPts val="500"/>
+              </a:spcBef>
+              <a:buFont typeface="Arial" panose="020B0604020202020204" pitchFamily="34" charset="0"/>
+              <a:buChar char="•"/>
+              <a:defRPr sz="1800" kern="1200">
+                <a:solidFill>
+                  <a:schemeClr val="tx1"/>
+                </a:solidFill>
+                <a:latin typeface="+mn-lt"/>
+                <a:ea typeface="+mn-ea"/>
+                <a:cs typeface="+mn-cs"/>
+              </a:defRPr>
+            </a:lvl8pPr>
+            <a:lvl9pPr marL="3886200" indent="-228600" algn="l" defTabSz="914400" rtl="0" eaLnBrk="1" latinLnBrk="0" hangingPunct="1">
+              <a:lnSpc>
+                <a:spcPct val="90000"/>
+              </a:lnSpc>
+              <a:spcBef>
+                <a:spcPts val="500"/>
+              </a:spcBef>
+              <a:buFont typeface="Arial" panose="020B0604020202020204" pitchFamily="34" charset="0"/>
+              <a:buChar char="•"/>
+              <a:defRPr sz="1800" kern="1200">
+                <a:solidFill>
+                  <a:schemeClr val="tx1"/>
+                </a:solidFill>
+                <a:latin typeface="+mn-lt"/>
+                <a:ea typeface="+mn-ea"/>
+                <a:cs typeface="+mn-cs"/>
+              </a:defRPr>
+            </a:lvl9pPr>
+          </a:lstStyle>
+          <a:p>
+            <a:r>
+              <a:rPr lang="en-US" sz="1600" dirty="0"/>
+              <a:t>THEIR RESULTS IN OCTAVE</a:t>
+            </a:r>
+          </a:p>
+          <a:p>
+            <a:r>
+              <a:rPr lang="en-US" sz="1600" dirty="0"/>
+              <a:t>R0 = [4.6198e-3, 1.7810e-3, 1.1351e-3]</a:t>
+            </a:r>
+          </a:p>
+          <a:p>
+            <a:r>
+              <a:rPr lang="en-US" sz="1600" dirty="0"/>
+              <a:t>Eta = [0.98174, 0.99102, 0.98965]</a:t>
+            </a:r>
+          </a:p>
+          <a:p>
+            <a:r>
+              <a:rPr lang="en-US" sz="1600" dirty="0" err="1"/>
+              <a:t>Qparam</a:t>
+            </a:r>
+            <a:r>
+              <a:rPr lang="en-US" sz="1600" dirty="0"/>
+              <a:t> = [14.592, 14.532, 14.444]</a:t>
+            </a:r>
+          </a:p>
+          <a:p>
+            <a:r>
+              <a:rPr lang="en-US" sz="1600" dirty="0" err="1"/>
+              <a:t>Rparam</a:t>
+            </a:r>
+            <a:r>
+              <a:rPr lang="en-US" sz="1600" dirty="0"/>
+              <a:t> = [0.0008368, 0.64769e-3, 0.000535]</a:t>
+            </a:r>
+          </a:p>
+          <a:p>
+            <a:r>
+              <a:rPr lang="en-US" sz="1600" dirty="0" err="1"/>
+              <a:t>Rcparam</a:t>
+            </a:r>
+            <a:r>
+              <a:rPr lang="en-US" sz="1600" dirty="0"/>
+              <a:t> = [2.3844, 5.1555, 4.2939]</a:t>
+            </a:r>
+          </a:p>
+          <a:p>
+            <a:r>
+              <a:rPr lang="en-US" sz="1600" dirty="0" err="1"/>
+              <a:t>Cparam</a:t>
+            </a:r>
+            <a:r>
+              <a:rPr lang="en-US" sz="1600" dirty="0"/>
+              <a:t> = 7.9598e3</a:t>
+            </a:r>
+          </a:p>
+          <a:p>
+            <a:r>
+              <a:rPr lang="en-US" sz="1600" dirty="0"/>
+              <a:t>M0Param = [0.0031315, 0.0023535, 0.0011502]</a:t>
+            </a:r>
+          </a:p>
+          <a:p>
+            <a:r>
+              <a:rPr lang="en-US" sz="1600" dirty="0" err="1"/>
+              <a:t>Mparam</a:t>
+            </a:r>
+            <a:r>
+              <a:rPr lang="en-US" sz="1600" dirty="0"/>
+              <a:t> = [0.039929, 0.020018, 0.020545]</a:t>
+            </a:r>
+          </a:p>
+          <a:p>
+            <a:r>
+              <a:rPr lang="en-US" sz="1600" dirty="0" err="1"/>
+              <a:t>Gparam</a:t>
+            </a:r>
+            <a:r>
+              <a:rPr lang="en-US" sz="1600" dirty="0"/>
+              <a:t> = [67.207, 92.645, 67.840]</a:t>
+            </a:r>
+          </a:p>
+        </p:txBody>
+      </p:sp>
+      <p:pic>
+        <p:nvPicPr>
+          <p:cNvPr id="6" name="Content Placeholder 5">
+            <a:extLst>
+              <a:ext uri="{FF2B5EF4-FFF2-40B4-BE49-F238E27FC236}">
+                <a16:creationId xmlns:a16="http://schemas.microsoft.com/office/drawing/2014/main" id="{92AD36CB-F262-1D11-6574-C947B5093E99}"/>
+              </a:ext>
+            </a:extLst>
+          </p:cNvPr>
+          <p:cNvPicPr>
+            <a:picLocks noGrp="1" noChangeAspect="1"/>
+          </p:cNvPicPr>
+          <p:nvPr>
+            <p:ph idx="1"/>
+          </p:nvPr>
+        </p:nvPicPr>
+        <p:blipFill>
+          <a:blip r:embed="rId2"/>
+          <a:stretch>
+            <a:fillRect/>
+          </a:stretch>
+        </p:blipFill>
+        <p:spPr>
+          <a:xfrm>
+            <a:off x="320462" y="1400542"/>
+            <a:ext cx="9155882" cy="4428565"/>
+          </a:xfrm>
+        </p:spPr>
+      </p:pic>
+    </p:spTree>
+    <p:extLst>
+      <p:ext uri="{BB962C8B-B14F-4D97-AF65-F5344CB8AC3E}">
+        <p14:creationId xmlns:p14="http://schemas.microsoft.com/office/powerpoint/2010/main" val="1376852897"/>
+      </p:ext>
+    </p:extLst>
+  </p:cSld>
+  <p:clrMapOvr>
+    <a:masterClrMapping/>
+  </p:clrMapOvr>
+</p:sld>
+</file>
+
+<file path=ppt/slides/slide16.xml><?xml version="1.0" encoding="utf-8"?>
+<p:sld xmlns:a="http://schemas.openxmlformats.org/drawingml/2006/main" xmlns:r="http://schemas.openxmlformats.org/officeDocument/2006/relationships" xmlns:p="http://schemas.openxmlformats.org/presentationml/2006/main">
+  <p:cSld>
+    <p:spTree>
+      <p:nvGrpSpPr>
+        <p:cNvPr id="1" name=""/>
+        <p:cNvGrpSpPr/>
+        <p:nvPr/>
+      </p:nvGrpSpPr>
+      <p:grpSpPr>
+        <a:xfrm>
+          <a:off x="0" y="0"/>
+          <a:ext cx="0" cy="0"/>
+          <a:chOff x="0" y="0"/>
+          <a:chExt cx="0" cy="0"/>
+        </a:xfrm>
+      </p:grpSpPr>
+      <p:sp>
+        <p:nvSpPr>
+          <p:cNvPr id="2" name="Title 1">
+            <a:extLst>
+              <a:ext uri="{FF2B5EF4-FFF2-40B4-BE49-F238E27FC236}">
+                <a16:creationId xmlns:a16="http://schemas.microsoft.com/office/drawing/2014/main" id="{22019C7E-90B8-94A7-5156-A33BC9F5F2CA}"/>
+              </a:ext>
+            </a:extLst>
+          </p:cNvPr>
+          <p:cNvSpPr>
+            <a:spLocks noGrp="1"/>
+          </p:cNvSpPr>
+          <p:nvPr>
+            <p:ph type="title"/>
+          </p:nvPr>
+        </p:nvSpPr>
+        <p:spPr>
+          <a:xfrm>
+            <a:off x="598759" y="74979"/>
+            <a:ext cx="10515600" cy="1325563"/>
+          </a:xfrm>
+        </p:spPr>
+        <p:txBody>
+          <a:bodyPr>
+            <a:normAutofit/>
+          </a:bodyPr>
+          <a:lstStyle/>
+          <a:p>
+            <a:r>
+              <a:rPr lang="en-US" dirty="0"/>
+              <a:t>No hysteresis, no RC, VHIL typhoon data.</a:t>
+            </a:r>
+          </a:p>
+        </p:txBody>
+      </p:sp>
+      <p:sp>
+        <p:nvSpPr>
+          <p:cNvPr id="10" name="Content Placeholder 2">
+            <a:extLst>
+              <a:ext uri="{FF2B5EF4-FFF2-40B4-BE49-F238E27FC236}">
+                <a16:creationId xmlns:a16="http://schemas.microsoft.com/office/drawing/2014/main" id="{FEB48DA9-CC05-AC51-AF21-ECBA3B2B42DB}"/>
+              </a:ext>
+            </a:extLst>
+          </p:cNvPr>
+          <p:cNvSpPr txBox="1">
+            <a:spLocks/>
+          </p:cNvSpPr>
+          <p:nvPr/>
+        </p:nvSpPr>
+        <p:spPr>
+          <a:xfrm>
+            <a:off x="9476344" y="2144443"/>
+            <a:ext cx="3751385" cy="4428565"/>
+          </a:xfrm>
+          <a:prstGeom prst="rect">
+            <a:avLst/>
+          </a:prstGeom>
+        </p:spPr>
+        <p:txBody>
+          <a:bodyPr vert="horz" lIns="91440" tIns="45720" rIns="91440" bIns="45720" rtlCol="0">
+            <a:normAutofit/>
+          </a:bodyPr>
+          <a:lstStyle>
+            <a:lvl1pPr marL="228600" indent="-228600" algn="l" defTabSz="914400" rtl="0" eaLnBrk="1" latinLnBrk="0" hangingPunct="1">
+              <a:lnSpc>
+                <a:spcPct val="90000"/>
+              </a:lnSpc>
+              <a:spcBef>
+                <a:spcPts val="1000"/>
+              </a:spcBef>
+              <a:buFont typeface="Arial" panose="020B0604020202020204" pitchFamily="34" charset="0"/>
+              <a:buChar char="•"/>
+              <a:defRPr sz="2800" kern="1200">
+                <a:solidFill>
+                  <a:schemeClr val="tx1"/>
+                </a:solidFill>
+                <a:latin typeface="+mn-lt"/>
+                <a:ea typeface="+mn-ea"/>
+                <a:cs typeface="+mn-cs"/>
+              </a:defRPr>
+            </a:lvl1pPr>
+            <a:lvl2pPr marL="685800" indent="-228600" algn="l" defTabSz="914400" rtl="0" eaLnBrk="1" latinLnBrk="0" hangingPunct="1">
+              <a:lnSpc>
+                <a:spcPct val="90000"/>
+              </a:lnSpc>
+              <a:spcBef>
+                <a:spcPts val="500"/>
+              </a:spcBef>
+              <a:buFont typeface="Arial" panose="020B0604020202020204" pitchFamily="34" charset="0"/>
+              <a:buChar char="•"/>
+              <a:defRPr sz="2400" kern="1200">
+                <a:solidFill>
+                  <a:schemeClr val="tx1"/>
+                </a:solidFill>
+                <a:latin typeface="+mn-lt"/>
+                <a:ea typeface="+mn-ea"/>
+                <a:cs typeface="+mn-cs"/>
+              </a:defRPr>
+            </a:lvl2pPr>
+            <a:lvl3pPr marL="1143000" indent="-228600" algn="l" defTabSz="914400" rtl="0" eaLnBrk="1" latinLnBrk="0" hangingPunct="1">
+              <a:lnSpc>
+                <a:spcPct val="90000"/>
+              </a:lnSpc>
+              <a:spcBef>
+                <a:spcPts val="500"/>
+              </a:spcBef>
+              <a:buFont typeface="Arial" panose="020B0604020202020204" pitchFamily="34" charset="0"/>
+              <a:buChar char="•"/>
+              <a:defRPr sz="2000" kern="1200">
+                <a:solidFill>
+                  <a:schemeClr val="tx1"/>
+                </a:solidFill>
+                <a:latin typeface="+mn-lt"/>
+                <a:ea typeface="+mn-ea"/>
+                <a:cs typeface="+mn-cs"/>
+              </a:defRPr>
+            </a:lvl3pPr>
+            <a:lvl4pPr marL="1600200" indent="-228600" algn="l" defTabSz="914400" rtl="0" eaLnBrk="1" latinLnBrk="0" hangingPunct="1">
+              <a:lnSpc>
+                <a:spcPct val="90000"/>
+              </a:lnSpc>
+              <a:spcBef>
+                <a:spcPts val="500"/>
+              </a:spcBef>
+              <a:buFont typeface="Arial" panose="020B0604020202020204" pitchFamily="34" charset="0"/>
+              <a:buChar char="•"/>
+              <a:defRPr sz="1800" kern="1200">
+                <a:solidFill>
+                  <a:schemeClr val="tx1"/>
+                </a:solidFill>
+                <a:latin typeface="+mn-lt"/>
+                <a:ea typeface="+mn-ea"/>
+                <a:cs typeface="+mn-cs"/>
+              </a:defRPr>
+            </a:lvl4pPr>
+            <a:lvl5pPr marL="2057400" indent="-228600" algn="l" defTabSz="914400" rtl="0" eaLnBrk="1" latinLnBrk="0" hangingPunct="1">
+              <a:lnSpc>
+                <a:spcPct val="90000"/>
+              </a:lnSpc>
+              <a:spcBef>
+                <a:spcPts val="500"/>
+              </a:spcBef>
+              <a:buFont typeface="Arial" panose="020B0604020202020204" pitchFamily="34" charset="0"/>
+              <a:buChar char="•"/>
+              <a:defRPr sz="1800" kern="1200">
+                <a:solidFill>
+                  <a:schemeClr val="tx1"/>
+                </a:solidFill>
+                <a:latin typeface="+mn-lt"/>
+                <a:ea typeface="+mn-ea"/>
+                <a:cs typeface="+mn-cs"/>
+              </a:defRPr>
+            </a:lvl5pPr>
+            <a:lvl6pPr marL="2514600" indent="-228600" algn="l" defTabSz="914400" rtl="0" eaLnBrk="1" latinLnBrk="0" hangingPunct="1">
+              <a:lnSpc>
+                <a:spcPct val="90000"/>
+              </a:lnSpc>
+              <a:spcBef>
+                <a:spcPts val="500"/>
+              </a:spcBef>
+              <a:buFont typeface="Arial" panose="020B0604020202020204" pitchFamily="34" charset="0"/>
+              <a:buChar char="•"/>
+              <a:defRPr sz="1800" kern="1200">
+                <a:solidFill>
+                  <a:schemeClr val="tx1"/>
+                </a:solidFill>
+                <a:latin typeface="+mn-lt"/>
+                <a:ea typeface="+mn-ea"/>
+                <a:cs typeface="+mn-cs"/>
+              </a:defRPr>
+            </a:lvl6pPr>
+            <a:lvl7pPr marL="2971800" indent="-228600" algn="l" defTabSz="914400" rtl="0" eaLnBrk="1" latinLnBrk="0" hangingPunct="1">
+              <a:lnSpc>
+                <a:spcPct val="90000"/>
+              </a:lnSpc>
+              <a:spcBef>
+                <a:spcPts val="500"/>
+              </a:spcBef>
+              <a:buFont typeface="Arial" panose="020B0604020202020204" pitchFamily="34" charset="0"/>
+              <a:buChar char="•"/>
+              <a:defRPr sz="1800" kern="1200">
+                <a:solidFill>
+                  <a:schemeClr val="tx1"/>
+                </a:solidFill>
+                <a:latin typeface="+mn-lt"/>
+                <a:ea typeface="+mn-ea"/>
+                <a:cs typeface="+mn-cs"/>
+              </a:defRPr>
+            </a:lvl7pPr>
+            <a:lvl8pPr marL="3429000" indent="-228600" algn="l" defTabSz="914400" rtl="0" eaLnBrk="1" latinLnBrk="0" hangingPunct="1">
+              <a:lnSpc>
+                <a:spcPct val="90000"/>
+              </a:lnSpc>
+              <a:spcBef>
+                <a:spcPts val="500"/>
+              </a:spcBef>
+              <a:buFont typeface="Arial" panose="020B0604020202020204" pitchFamily="34" charset="0"/>
+              <a:buChar char="•"/>
+              <a:defRPr sz="1800" kern="1200">
+                <a:solidFill>
+                  <a:schemeClr val="tx1"/>
+                </a:solidFill>
+                <a:latin typeface="+mn-lt"/>
+                <a:ea typeface="+mn-ea"/>
+                <a:cs typeface="+mn-cs"/>
+              </a:defRPr>
+            </a:lvl8pPr>
+            <a:lvl9pPr marL="3886200" indent="-228600" algn="l" defTabSz="914400" rtl="0" eaLnBrk="1" latinLnBrk="0" hangingPunct="1">
+              <a:lnSpc>
+                <a:spcPct val="90000"/>
+              </a:lnSpc>
+              <a:spcBef>
+                <a:spcPts val="500"/>
+              </a:spcBef>
+              <a:buFont typeface="Arial" panose="020B0604020202020204" pitchFamily="34" charset="0"/>
+              <a:buChar char="•"/>
+              <a:defRPr sz="1800" kern="1200">
+                <a:solidFill>
+                  <a:schemeClr val="tx1"/>
+                </a:solidFill>
+                <a:latin typeface="+mn-lt"/>
+                <a:ea typeface="+mn-ea"/>
+                <a:cs typeface="+mn-cs"/>
+              </a:defRPr>
+            </a:lvl9pPr>
+          </a:lstStyle>
+          <a:p>
+            <a:r>
+              <a:rPr lang="en-US" sz="1600" dirty="0"/>
+              <a:t>THEIR RESULTS IN OCTAVE</a:t>
+            </a:r>
+          </a:p>
+          <a:p>
+            <a:r>
+              <a:rPr lang="en-US" sz="1600" dirty="0"/>
+              <a:t>R0 = [4.6198e-3, 1.7810e-3, 1.1351e-3]</a:t>
+            </a:r>
+          </a:p>
+          <a:p>
+            <a:r>
+              <a:rPr lang="en-US" sz="1600" dirty="0"/>
+              <a:t>Eta = [0.98174, 0.99102, 0.98965]</a:t>
+            </a:r>
+          </a:p>
+          <a:p>
+            <a:r>
+              <a:rPr lang="en-US" sz="1600" dirty="0" err="1"/>
+              <a:t>Qparam</a:t>
+            </a:r>
+            <a:r>
+              <a:rPr lang="en-US" sz="1600" dirty="0"/>
+              <a:t> = [14.592, 14.532, 14.444]</a:t>
+            </a:r>
+          </a:p>
+          <a:p>
+            <a:r>
+              <a:rPr lang="en-US" sz="1600" dirty="0" err="1"/>
+              <a:t>Rparam</a:t>
+            </a:r>
+            <a:r>
+              <a:rPr lang="en-US" sz="1600" dirty="0"/>
+              <a:t> = [0.0008368, 0.64769e-3, 0.000535]</a:t>
+            </a:r>
+          </a:p>
+          <a:p>
+            <a:r>
+              <a:rPr lang="en-US" sz="1600" dirty="0" err="1"/>
+              <a:t>Rcparam</a:t>
+            </a:r>
+            <a:r>
+              <a:rPr lang="en-US" sz="1600" dirty="0"/>
+              <a:t> = [2.3844, 5.1555, 4.2939]</a:t>
+            </a:r>
+          </a:p>
+          <a:p>
+            <a:r>
+              <a:rPr lang="en-US" sz="1600" dirty="0" err="1"/>
+              <a:t>Cparam</a:t>
+            </a:r>
+            <a:r>
+              <a:rPr lang="en-US" sz="1600" dirty="0"/>
+              <a:t> = 7.9598e3</a:t>
+            </a:r>
+          </a:p>
+          <a:p>
+            <a:r>
+              <a:rPr lang="en-US" sz="1600" dirty="0"/>
+              <a:t>M0Param = [0.0031315, 0.0023535, 0.0011502]</a:t>
+            </a:r>
+          </a:p>
+          <a:p>
+            <a:r>
+              <a:rPr lang="en-US" sz="1600" dirty="0" err="1"/>
+              <a:t>Mparam</a:t>
+            </a:r>
+            <a:r>
+              <a:rPr lang="en-US" sz="1600" dirty="0"/>
+              <a:t> = [0.039929, 0.020018, 0.020545]</a:t>
+            </a:r>
+          </a:p>
+          <a:p>
+            <a:r>
+              <a:rPr lang="en-US" sz="1600" dirty="0" err="1"/>
+              <a:t>Gparam</a:t>
+            </a:r>
+            <a:r>
+              <a:rPr lang="en-US" sz="1600" dirty="0"/>
+              <a:t> = [67.207, 92.645, 67.840]</a:t>
+            </a:r>
+          </a:p>
+        </p:txBody>
+      </p:sp>
+      <p:pic>
+        <p:nvPicPr>
+          <p:cNvPr id="7" name="Content Placeholder 6">
+            <a:extLst>
+              <a:ext uri="{FF2B5EF4-FFF2-40B4-BE49-F238E27FC236}">
+                <a16:creationId xmlns:a16="http://schemas.microsoft.com/office/drawing/2014/main" id="{1F023FC9-5A47-1972-9B72-018B5151393E}"/>
+              </a:ext>
+            </a:extLst>
+          </p:cNvPr>
+          <p:cNvPicPr>
+            <a:picLocks noGrp="1" noChangeAspect="1"/>
+          </p:cNvPicPr>
+          <p:nvPr>
+            <p:ph idx="1"/>
+          </p:nvPr>
+        </p:nvPicPr>
+        <p:blipFill>
+          <a:blip r:embed="rId2"/>
+          <a:stretch>
+            <a:fillRect/>
+          </a:stretch>
+        </p:blipFill>
+        <p:spPr>
+          <a:xfrm>
+            <a:off x="519961" y="1503257"/>
+            <a:ext cx="8830907" cy="4134427"/>
+          </a:xfrm>
+        </p:spPr>
+      </p:pic>
+    </p:spTree>
+    <p:extLst>
+      <p:ext uri="{BB962C8B-B14F-4D97-AF65-F5344CB8AC3E}">
+        <p14:creationId xmlns:p14="http://schemas.microsoft.com/office/powerpoint/2010/main" val="4242718506"/>
+      </p:ext>
+    </p:extLst>
+  </p:cSld>
+  <p:clrMapOvr>
+    <a:masterClrMapping/>
+  </p:clrMapOvr>
+</p:sld>
+</file>
+
 <file path=ppt/slides/slide2.xml><?xml version="1.0" encoding="utf-8"?>
 <p:sld xmlns:a="http://schemas.openxmlformats.org/drawingml/2006/main" xmlns:r="http://schemas.openxmlformats.org/officeDocument/2006/relationships" xmlns:p="http://schemas.openxmlformats.org/presentationml/2006/main">
   <p:cSld>
@@ -3468,11 +5041,288 @@
         </p:blipFill>
         <p:spPr>
           <a:xfrm>
-            <a:off x="1690072" y="1886449"/>
+            <a:off x="372260" y="1690688"/>
             <a:ext cx="8811855" cy="4229690"/>
           </a:xfrm>
         </p:spPr>
       </p:pic>
+      <p:sp>
+        <p:nvSpPr>
+          <p:cNvPr id="3" name="Content Placeholder 2">
+            <a:extLst>
+              <a:ext uri="{FF2B5EF4-FFF2-40B4-BE49-F238E27FC236}">
+                <a16:creationId xmlns:a16="http://schemas.microsoft.com/office/drawing/2014/main" id="{7085801C-63BE-8CCD-BAD9-18EF55F4F2E5}"/>
+              </a:ext>
+            </a:extLst>
+          </p:cNvPr>
+          <p:cNvSpPr txBox="1">
+            <a:spLocks/>
+          </p:cNvSpPr>
+          <p:nvPr/>
+        </p:nvSpPr>
+        <p:spPr>
+          <a:xfrm>
+            <a:off x="9262610" y="1371600"/>
+            <a:ext cx="3751385" cy="4428565"/>
+          </a:xfrm>
+          <a:prstGeom prst="rect">
+            <a:avLst/>
+          </a:prstGeom>
+        </p:spPr>
+        <p:txBody>
+          <a:bodyPr vert="horz" lIns="91440" tIns="45720" rIns="91440" bIns="45720" rtlCol="0">
+            <a:normAutofit/>
+          </a:bodyPr>
+          <a:lstStyle>
+            <a:lvl1pPr marL="228600" indent="-228600" algn="l" defTabSz="914400" rtl="0" eaLnBrk="1" latinLnBrk="0" hangingPunct="1">
+              <a:lnSpc>
+                <a:spcPct val="90000"/>
+              </a:lnSpc>
+              <a:spcBef>
+                <a:spcPts val="1000"/>
+              </a:spcBef>
+              <a:buFont typeface="Arial" panose="020B0604020202020204" pitchFamily="34" charset="0"/>
+              <a:buChar char="•"/>
+              <a:defRPr sz="2800" kern="1200">
+                <a:solidFill>
+                  <a:schemeClr val="tx1"/>
+                </a:solidFill>
+                <a:latin typeface="+mn-lt"/>
+                <a:ea typeface="+mn-ea"/>
+                <a:cs typeface="+mn-cs"/>
+              </a:defRPr>
+            </a:lvl1pPr>
+            <a:lvl2pPr marL="685800" indent="-228600" algn="l" defTabSz="914400" rtl="0" eaLnBrk="1" latinLnBrk="0" hangingPunct="1">
+              <a:lnSpc>
+                <a:spcPct val="90000"/>
+              </a:lnSpc>
+              <a:spcBef>
+                <a:spcPts val="500"/>
+              </a:spcBef>
+              <a:buFont typeface="Arial" panose="020B0604020202020204" pitchFamily="34" charset="0"/>
+              <a:buChar char="•"/>
+              <a:defRPr sz="2400" kern="1200">
+                <a:solidFill>
+                  <a:schemeClr val="tx1"/>
+                </a:solidFill>
+                <a:latin typeface="+mn-lt"/>
+                <a:ea typeface="+mn-ea"/>
+                <a:cs typeface="+mn-cs"/>
+              </a:defRPr>
+            </a:lvl2pPr>
+            <a:lvl3pPr marL="1143000" indent="-228600" algn="l" defTabSz="914400" rtl="0" eaLnBrk="1" latinLnBrk="0" hangingPunct="1">
+              <a:lnSpc>
+                <a:spcPct val="90000"/>
+              </a:lnSpc>
+              <a:spcBef>
+                <a:spcPts val="500"/>
+              </a:spcBef>
+              <a:buFont typeface="Arial" panose="020B0604020202020204" pitchFamily="34" charset="0"/>
+              <a:buChar char="•"/>
+              <a:defRPr sz="2000" kern="1200">
+                <a:solidFill>
+                  <a:schemeClr val="tx1"/>
+                </a:solidFill>
+                <a:latin typeface="+mn-lt"/>
+                <a:ea typeface="+mn-ea"/>
+                <a:cs typeface="+mn-cs"/>
+              </a:defRPr>
+            </a:lvl3pPr>
+            <a:lvl4pPr marL="1600200" indent="-228600" algn="l" defTabSz="914400" rtl="0" eaLnBrk="1" latinLnBrk="0" hangingPunct="1">
+              <a:lnSpc>
+                <a:spcPct val="90000"/>
+              </a:lnSpc>
+              <a:spcBef>
+                <a:spcPts val="500"/>
+              </a:spcBef>
+              <a:buFont typeface="Arial" panose="020B0604020202020204" pitchFamily="34" charset="0"/>
+              <a:buChar char="•"/>
+              <a:defRPr sz="1800" kern="1200">
+                <a:solidFill>
+                  <a:schemeClr val="tx1"/>
+                </a:solidFill>
+                <a:latin typeface="+mn-lt"/>
+                <a:ea typeface="+mn-ea"/>
+                <a:cs typeface="+mn-cs"/>
+              </a:defRPr>
+            </a:lvl4pPr>
+            <a:lvl5pPr marL="2057400" indent="-228600" algn="l" defTabSz="914400" rtl="0" eaLnBrk="1" latinLnBrk="0" hangingPunct="1">
+              <a:lnSpc>
+                <a:spcPct val="90000"/>
+              </a:lnSpc>
+              <a:spcBef>
+                <a:spcPts val="500"/>
+              </a:spcBef>
+              <a:buFont typeface="Arial" panose="020B0604020202020204" pitchFamily="34" charset="0"/>
+              <a:buChar char="•"/>
+              <a:defRPr sz="1800" kern="1200">
+                <a:solidFill>
+                  <a:schemeClr val="tx1"/>
+                </a:solidFill>
+                <a:latin typeface="+mn-lt"/>
+                <a:ea typeface="+mn-ea"/>
+                <a:cs typeface="+mn-cs"/>
+              </a:defRPr>
+            </a:lvl5pPr>
+            <a:lvl6pPr marL="2514600" indent="-228600" algn="l" defTabSz="914400" rtl="0" eaLnBrk="1" latinLnBrk="0" hangingPunct="1">
+              <a:lnSpc>
+                <a:spcPct val="90000"/>
+              </a:lnSpc>
+              <a:spcBef>
+                <a:spcPts val="500"/>
+              </a:spcBef>
+              <a:buFont typeface="Arial" panose="020B0604020202020204" pitchFamily="34" charset="0"/>
+              <a:buChar char="•"/>
+              <a:defRPr sz="1800" kern="1200">
+                <a:solidFill>
+                  <a:schemeClr val="tx1"/>
+                </a:solidFill>
+                <a:latin typeface="+mn-lt"/>
+                <a:ea typeface="+mn-ea"/>
+                <a:cs typeface="+mn-cs"/>
+              </a:defRPr>
+            </a:lvl6pPr>
+            <a:lvl7pPr marL="2971800" indent="-228600" algn="l" defTabSz="914400" rtl="0" eaLnBrk="1" latinLnBrk="0" hangingPunct="1">
+              <a:lnSpc>
+                <a:spcPct val="90000"/>
+              </a:lnSpc>
+              <a:spcBef>
+                <a:spcPts val="500"/>
+              </a:spcBef>
+              <a:buFont typeface="Arial" panose="020B0604020202020204" pitchFamily="34" charset="0"/>
+              <a:buChar char="•"/>
+              <a:defRPr sz="1800" kern="1200">
+                <a:solidFill>
+                  <a:schemeClr val="tx1"/>
+                </a:solidFill>
+                <a:latin typeface="+mn-lt"/>
+                <a:ea typeface="+mn-ea"/>
+                <a:cs typeface="+mn-cs"/>
+              </a:defRPr>
+            </a:lvl7pPr>
+            <a:lvl8pPr marL="3429000" indent="-228600" algn="l" defTabSz="914400" rtl="0" eaLnBrk="1" latinLnBrk="0" hangingPunct="1">
+              <a:lnSpc>
+                <a:spcPct val="90000"/>
+              </a:lnSpc>
+              <a:spcBef>
+                <a:spcPts val="500"/>
+              </a:spcBef>
+              <a:buFont typeface="Arial" panose="020B0604020202020204" pitchFamily="34" charset="0"/>
+              <a:buChar char="•"/>
+              <a:defRPr sz="1800" kern="1200">
+                <a:solidFill>
+                  <a:schemeClr val="tx1"/>
+                </a:solidFill>
+                <a:latin typeface="+mn-lt"/>
+                <a:ea typeface="+mn-ea"/>
+                <a:cs typeface="+mn-cs"/>
+              </a:defRPr>
+            </a:lvl8pPr>
+            <a:lvl9pPr marL="3886200" indent="-228600" algn="l" defTabSz="914400" rtl="0" eaLnBrk="1" latinLnBrk="0" hangingPunct="1">
+              <a:lnSpc>
+                <a:spcPct val="90000"/>
+              </a:lnSpc>
+              <a:spcBef>
+                <a:spcPts val="500"/>
+              </a:spcBef>
+              <a:buFont typeface="Arial" panose="020B0604020202020204" pitchFamily="34" charset="0"/>
+              <a:buChar char="•"/>
+              <a:defRPr sz="1800" kern="1200">
+                <a:solidFill>
+                  <a:schemeClr val="tx1"/>
+                </a:solidFill>
+                <a:latin typeface="+mn-lt"/>
+                <a:ea typeface="+mn-ea"/>
+                <a:cs typeface="+mn-cs"/>
+              </a:defRPr>
+            </a:lvl9pPr>
+          </a:lstStyle>
+          <a:p>
+            <a:r>
+              <a:rPr lang="en-US" sz="1600" dirty="0"/>
+              <a:t>THEIR RESULTS IN OCTAVE</a:t>
+            </a:r>
+          </a:p>
+          <a:p>
+            <a:r>
+              <a:rPr lang="en-US" sz="1600" dirty="0"/>
+              <a:t>R0 = [4.6198e-3, 1.7810e-3, 1.1351e-3]</a:t>
+            </a:r>
+          </a:p>
+          <a:p>
+            <a:r>
+              <a:rPr lang="en-US" sz="1600" dirty="0"/>
+              <a:t>Eta = [0.98174, 0.99102, 0.98965]</a:t>
+            </a:r>
+          </a:p>
+          <a:p>
+            <a:r>
+              <a:rPr lang="en-US" sz="1600" dirty="0" err="1"/>
+              <a:t>Qparam</a:t>
+            </a:r>
+            <a:r>
+              <a:rPr lang="en-US" sz="1600" dirty="0"/>
+              <a:t> = [14.592, 14.532, 14.444]</a:t>
+            </a:r>
+          </a:p>
+          <a:p>
+            <a:r>
+              <a:rPr lang="en-US" sz="1600" dirty="0" err="1"/>
+              <a:t>Rparam</a:t>
+            </a:r>
+            <a:r>
+              <a:rPr lang="en-US" sz="1600" dirty="0"/>
+              <a:t> = [0.0008368, 0.64769e-3, 0.000535]</a:t>
+            </a:r>
+          </a:p>
+          <a:p>
+            <a:r>
+              <a:rPr lang="en-US" sz="1600" dirty="0" err="1"/>
+              <a:t>Rcparam</a:t>
+            </a:r>
+            <a:r>
+              <a:rPr lang="en-US" sz="1600" dirty="0"/>
+              <a:t> = [2.3844, 5.1555, 4.2939]</a:t>
+            </a:r>
+          </a:p>
+          <a:p>
+            <a:r>
+              <a:rPr lang="en-US" sz="1600" dirty="0" err="1"/>
+              <a:t>Cparam</a:t>
+            </a:r>
+            <a:r>
+              <a:rPr lang="en-US" sz="1600" dirty="0"/>
+              <a:t> = 7.9598e3</a:t>
+            </a:r>
+          </a:p>
+          <a:p>
+            <a:r>
+              <a:rPr lang="en-US" sz="1600" dirty="0"/>
+              <a:t>M0Param = [0.0031315, 0.0023535, 0.0011502]</a:t>
+            </a:r>
+          </a:p>
+          <a:p>
+            <a:r>
+              <a:rPr lang="en-US" sz="1600" dirty="0" err="1"/>
+              <a:t>Mparam</a:t>
+            </a:r>
+            <a:r>
+              <a:rPr lang="en-US" sz="1600" dirty="0"/>
+              <a:t> = [0.039929, 0.020018, 0.020545]</a:t>
+            </a:r>
+          </a:p>
+          <a:p>
+            <a:r>
+              <a:rPr lang="en-US" sz="1600" dirty="0" err="1"/>
+              <a:t>Gparam</a:t>
+            </a:r>
+            <a:r>
+              <a:rPr lang="en-US" sz="1600" dirty="0"/>
+              <a:t> = [67.207, 92.645, 67.840]</a:t>
+            </a:r>
+          </a:p>
+        </p:txBody>
+      </p:sp>
     </p:spTree>
     <p:extLst>
       <p:ext uri="{BB962C8B-B14F-4D97-AF65-F5344CB8AC3E}">
@@ -3555,11 +5405,288 @@
         </p:blipFill>
         <p:spPr>
           <a:xfrm>
-            <a:off x="1713888" y="1948370"/>
+            <a:off x="148858" y="2009916"/>
             <a:ext cx="8764223" cy="4105848"/>
           </a:xfrm>
         </p:spPr>
       </p:pic>
+      <p:sp>
+        <p:nvSpPr>
+          <p:cNvPr id="3" name="Content Placeholder 2">
+            <a:extLst>
+              <a:ext uri="{FF2B5EF4-FFF2-40B4-BE49-F238E27FC236}">
+                <a16:creationId xmlns:a16="http://schemas.microsoft.com/office/drawing/2014/main" id="{B93E4B9E-0EF0-7F13-98E6-11FD75B67241}"/>
+              </a:ext>
+            </a:extLst>
+          </p:cNvPr>
+          <p:cNvSpPr txBox="1">
+            <a:spLocks/>
+          </p:cNvSpPr>
+          <p:nvPr/>
+        </p:nvSpPr>
+        <p:spPr>
+          <a:xfrm>
+            <a:off x="9271402" y="1690688"/>
+            <a:ext cx="3751385" cy="4428565"/>
+          </a:xfrm>
+          <a:prstGeom prst="rect">
+            <a:avLst/>
+          </a:prstGeom>
+        </p:spPr>
+        <p:txBody>
+          <a:bodyPr vert="horz" lIns="91440" tIns="45720" rIns="91440" bIns="45720" rtlCol="0">
+            <a:normAutofit/>
+          </a:bodyPr>
+          <a:lstStyle>
+            <a:lvl1pPr marL="228600" indent="-228600" algn="l" defTabSz="914400" rtl="0" eaLnBrk="1" latinLnBrk="0" hangingPunct="1">
+              <a:lnSpc>
+                <a:spcPct val="90000"/>
+              </a:lnSpc>
+              <a:spcBef>
+                <a:spcPts val="1000"/>
+              </a:spcBef>
+              <a:buFont typeface="Arial" panose="020B0604020202020204" pitchFamily="34" charset="0"/>
+              <a:buChar char="•"/>
+              <a:defRPr sz="2800" kern="1200">
+                <a:solidFill>
+                  <a:schemeClr val="tx1"/>
+                </a:solidFill>
+                <a:latin typeface="+mn-lt"/>
+                <a:ea typeface="+mn-ea"/>
+                <a:cs typeface="+mn-cs"/>
+              </a:defRPr>
+            </a:lvl1pPr>
+            <a:lvl2pPr marL="685800" indent="-228600" algn="l" defTabSz="914400" rtl="0" eaLnBrk="1" latinLnBrk="0" hangingPunct="1">
+              <a:lnSpc>
+                <a:spcPct val="90000"/>
+              </a:lnSpc>
+              <a:spcBef>
+                <a:spcPts val="500"/>
+              </a:spcBef>
+              <a:buFont typeface="Arial" panose="020B0604020202020204" pitchFamily="34" charset="0"/>
+              <a:buChar char="•"/>
+              <a:defRPr sz="2400" kern="1200">
+                <a:solidFill>
+                  <a:schemeClr val="tx1"/>
+                </a:solidFill>
+                <a:latin typeface="+mn-lt"/>
+                <a:ea typeface="+mn-ea"/>
+                <a:cs typeface="+mn-cs"/>
+              </a:defRPr>
+            </a:lvl2pPr>
+            <a:lvl3pPr marL="1143000" indent="-228600" algn="l" defTabSz="914400" rtl="0" eaLnBrk="1" latinLnBrk="0" hangingPunct="1">
+              <a:lnSpc>
+                <a:spcPct val="90000"/>
+              </a:lnSpc>
+              <a:spcBef>
+                <a:spcPts val="500"/>
+              </a:spcBef>
+              <a:buFont typeface="Arial" panose="020B0604020202020204" pitchFamily="34" charset="0"/>
+              <a:buChar char="•"/>
+              <a:defRPr sz="2000" kern="1200">
+                <a:solidFill>
+                  <a:schemeClr val="tx1"/>
+                </a:solidFill>
+                <a:latin typeface="+mn-lt"/>
+                <a:ea typeface="+mn-ea"/>
+                <a:cs typeface="+mn-cs"/>
+              </a:defRPr>
+            </a:lvl3pPr>
+            <a:lvl4pPr marL="1600200" indent="-228600" algn="l" defTabSz="914400" rtl="0" eaLnBrk="1" latinLnBrk="0" hangingPunct="1">
+              <a:lnSpc>
+                <a:spcPct val="90000"/>
+              </a:lnSpc>
+              <a:spcBef>
+                <a:spcPts val="500"/>
+              </a:spcBef>
+              <a:buFont typeface="Arial" panose="020B0604020202020204" pitchFamily="34" charset="0"/>
+              <a:buChar char="•"/>
+              <a:defRPr sz="1800" kern="1200">
+                <a:solidFill>
+                  <a:schemeClr val="tx1"/>
+                </a:solidFill>
+                <a:latin typeface="+mn-lt"/>
+                <a:ea typeface="+mn-ea"/>
+                <a:cs typeface="+mn-cs"/>
+              </a:defRPr>
+            </a:lvl4pPr>
+            <a:lvl5pPr marL="2057400" indent="-228600" algn="l" defTabSz="914400" rtl="0" eaLnBrk="1" latinLnBrk="0" hangingPunct="1">
+              <a:lnSpc>
+                <a:spcPct val="90000"/>
+              </a:lnSpc>
+              <a:spcBef>
+                <a:spcPts val="500"/>
+              </a:spcBef>
+              <a:buFont typeface="Arial" panose="020B0604020202020204" pitchFamily="34" charset="0"/>
+              <a:buChar char="•"/>
+              <a:defRPr sz="1800" kern="1200">
+                <a:solidFill>
+                  <a:schemeClr val="tx1"/>
+                </a:solidFill>
+                <a:latin typeface="+mn-lt"/>
+                <a:ea typeface="+mn-ea"/>
+                <a:cs typeface="+mn-cs"/>
+              </a:defRPr>
+            </a:lvl5pPr>
+            <a:lvl6pPr marL="2514600" indent="-228600" algn="l" defTabSz="914400" rtl="0" eaLnBrk="1" latinLnBrk="0" hangingPunct="1">
+              <a:lnSpc>
+                <a:spcPct val="90000"/>
+              </a:lnSpc>
+              <a:spcBef>
+                <a:spcPts val="500"/>
+              </a:spcBef>
+              <a:buFont typeface="Arial" panose="020B0604020202020204" pitchFamily="34" charset="0"/>
+              <a:buChar char="•"/>
+              <a:defRPr sz="1800" kern="1200">
+                <a:solidFill>
+                  <a:schemeClr val="tx1"/>
+                </a:solidFill>
+                <a:latin typeface="+mn-lt"/>
+                <a:ea typeface="+mn-ea"/>
+                <a:cs typeface="+mn-cs"/>
+              </a:defRPr>
+            </a:lvl6pPr>
+            <a:lvl7pPr marL="2971800" indent="-228600" algn="l" defTabSz="914400" rtl="0" eaLnBrk="1" latinLnBrk="0" hangingPunct="1">
+              <a:lnSpc>
+                <a:spcPct val="90000"/>
+              </a:lnSpc>
+              <a:spcBef>
+                <a:spcPts val="500"/>
+              </a:spcBef>
+              <a:buFont typeface="Arial" panose="020B0604020202020204" pitchFamily="34" charset="0"/>
+              <a:buChar char="•"/>
+              <a:defRPr sz="1800" kern="1200">
+                <a:solidFill>
+                  <a:schemeClr val="tx1"/>
+                </a:solidFill>
+                <a:latin typeface="+mn-lt"/>
+                <a:ea typeface="+mn-ea"/>
+                <a:cs typeface="+mn-cs"/>
+              </a:defRPr>
+            </a:lvl7pPr>
+            <a:lvl8pPr marL="3429000" indent="-228600" algn="l" defTabSz="914400" rtl="0" eaLnBrk="1" latinLnBrk="0" hangingPunct="1">
+              <a:lnSpc>
+                <a:spcPct val="90000"/>
+              </a:lnSpc>
+              <a:spcBef>
+                <a:spcPts val="500"/>
+              </a:spcBef>
+              <a:buFont typeface="Arial" panose="020B0604020202020204" pitchFamily="34" charset="0"/>
+              <a:buChar char="•"/>
+              <a:defRPr sz="1800" kern="1200">
+                <a:solidFill>
+                  <a:schemeClr val="tx1"/>
+                </a:solidFill>
+                <a:latin typeface="+mn-lt"/>
+                <a:ea typeface="+mn-ea"/>
+                <a:cs typeface="+mn-cs"/>
+              </a:defRPr>
+            </a:lvl8pPr>
+            <a:lvl9pPr marL="3886200" indent="-228600" algn="l" defTabSz="914400" rtl="0" eaLnBrk="1" latinLnBrk="0" hangingPunct="1">
+              <a:lnSpc>
+                <a:spcPct val="90000"/>
+              </a:lnSpc>
+              <a:spcBef>
+                <a:spcPts val="500"/>
+              </a:spcBef>
+              <a:buFont typeface="Arial" panose="020B0604020202020204" pitchFamily="34" charset="0"/>
+              <a:buChar char="•"/>
+              <a:defRPr sz="1800" kern="1200">
+                <a:solidFill>
+                  <a:schemeClr val="tx1"/>
+                </a:solidFill>
+                <a:latin typeface="+mn-lt"/>
+                <a:ea typeface="+mn-ea"/>
+                <a:cs typeface="+mn-cs"/>
+              </a:defRPr>
+            </a:lvl9pPr>
+          </a:lstStyle>
+          <a:p>
+            <a:r>
+              <a:rPr lang="en-US" sz="1600" dirty="0"/>
+              <a:t>THEIR RESULTS IN OCTAVE</a:t>
+            </a:r>
+          </a:p>
+          <a:p>
+            <a:r>
+              <a:rPr lang="en-US" sz="1600" dirty="0"/>
+              <a:t>R0 = [4.6198e-3, 1.7810e-3, 1.1351e-3]</a:t>
+            </a:r>
+          </a:p>
+          <a:p>
+            <a:r>
+              <a:rPr lang="en-US" sz="1600" dirty="0"/>
+              <a:t>Eta = [0.98174, 0.99102, 0.98965]</a:t>
+            </a:r>
+          </a:p>
+          <a:p>
+            <a:r>
+              <a:rPr lang="en-US" sz="1600" dirty="0" err="1"/>
+              <a:t>Qparam</a:t>
+            </a:r>
+            <a:r>
+              <a:rPr lang="en-US" sz="1600" dirty="0"/>
+              <a:t> = [14.592, 14.532, 14.444]</a:t>
+            </a:r>
+          </a:p>
+          <a:p>
+            <a:r>
+              <a:rPr lang="en-US" sz="1600" dirty="0" err="1"/>
+              <a:t>Rparam</a:t>
+            </a:r>
+            <a:r>
+              <a:rPr lang="en-US" sz="1600" dirty="0"/>
+              <a:t> = [0.0008368, 0.64769e-3, 0.000535]</a:t>
+            </a:r>
+          </a:p>
+          <a:p>
+            <a:r>
+              <a:rPr lang="en-US" sz="1600" dirty="0" err="1"/>
+              <a:t>Rcparam</a:t>
+            </a:r>
+            <a:r>
+              <a:rPr lang="en-US" sz="1600" dirty="0"/>
+              <a:t> = [2.3844, 5.1555, 4.2939]</a:t>
+            </a:r>
+          </a:p>
+          <a:p>
+            <a:r>
+              <a:rPr lang="en-US" sz="1600" dirty="0" err="1"/>
+              <a:t>Cparam</a:t>
+            </a:r>
+            <a:r>
+              <a:rPr lang="en-US" sz="1600" dirty="0"/>
+              <a:t> = 7.9598e3</a:t>
+            </a:r>
+          </a:p>
+          <a:p>
+            <a:r>
+              <a:rPr lang="en-US" sz="1600" dirty="0"/>
+              <a:t>M0Param = [0.0031315, 0.0023535, 0.0011502]</a:t>
+            </a:r>
+          </a:p>
+          <a:p>
+            <a:r>
+              <a:rPr lang="en-US" sz="1600" dirty="0" err="1"/>
+              <a:t>Mparam</a:t>
+            </a:r>
+            <a:r>
+              <a:rPr lang="en-US" sz="1600" dirty="0"/>
+              <a:t> = [0.039929, 0.020018, 0.020545]</a:t>
+            </a:r>
+          </a:p>
+          <a:p>
+            <a:r>
+              <a:rPr lang="en-US" sz="1600" dirty="0" err="1"/>
+              <a:t>Gparam</a:t>
+            </a:r>
+            <a:r>
+              <a:rPr lang="en-US" sz="1600" dirty="0"/>
+              <a:t> = [67.207, 92.645, 67.840]</a:t>
+            </a:r>
+          </a:p>
+        </p:txBody>
+      </p:sp>
     </p:spTree>
     <p:extLst>
       <p:ext uri="{BB962C8B-B14F-4D97-AF65-F5344CB8AC3E}">
@@ -3595,7 +5722,7 @@
           <p:cNvPr id="2" name="Title 1">
             <a:extLst>
               <a:ext uri="{FF2B5EF4-FFF2-40B4-BE49-F238E27FC236}">
-                <a16:creationId xmlns:a16="http://schemas.microsoft.com/office/drawing/2014/main" id="{2BC5A533-6E21-CA62-E715-8E44FC5164E5}"/>
+                <a16:creationId xmlns:a16="http://schemas.microsoft.com/office/drawing/2014/main" id="{26BA39E5-A558-003C-6217-A68A77011566}"/>
               </a:ext>
             </a:extLst>
           </p:cNvPr>
@@ -3613,15 +5740,7 @@
           <a:p>
             <a:r>
               <a:rPr lang="en-US" dirty="0"/>
-              <a:t>Problems probably come from </a:t>
-            </a:r>
-            <a:r>
-              <a:rPr lang="en-US" dirty="0" err="1"/>
-              <a:t>v_error</a:t>
-            </a:r>
-            <a:r>
-              <a:rPr lang="en-US" dirty="0"/>
-              <a:t> and corrected current calculation</a:t>
+              <a:t>Now, using same eta and Q from the static test</a:t>
             </a:r>
           </a:p>
         </p:txBody>
@@ -3631,7 +5750,7 @@
           <p:cNvPr id="5" name="Content Placeholder 4">
             <a:extLst>
               <a:ext uri="{FF2B5EF4-FFF2-40B4-BE49-F238E27FC236}">
-                <a16:creationId xmlns:a16="http://schemas.microsoft.com/office/drawing/2014/main" id="{00B22049-6476-CC2E-BE9B-84688FAD8246}"/>
+                <a16:creationId xmlns:a16="http://schemas.microsoft.com/office/drawing/2014/main" id="{4096090C-5C69-9D29-BF69-B9D7C9778467}"/>
               </a:ext>
             </a:extLst>
           </p:cNvPr>
@@ -3643,28 +5762,299 @@
           </p:nvPr>
         </p:nvPicPr>
         <p:blipFill>
-          <a:blip r:embed="rId2">
-            <a:extLst>
-              <a:ext uri="{28A0092B-C50C-407E-A947-70E740481C1C}">
-                <a14:useLocalDpi xmlns:a14="http://schemas.microsoft.com/office/drawing/2010/main" val="0"/>
-              </a:ext>
-            </a:extLst>
-          </a:blip>
+          <a:blip r:embed="rId2"/>
           <a:stretch>
             <a:fillRect/>
           </a:stretch>
         </p:blipFill>
         <p:spPr>
           <a:xfrm>
-            <a:off x="1744662" y="1825625"/>
-            <a:ext cx="8702676" cy="4351338"/>
+            <a:off x="454354" y="2183935"/>
+            <a:ext cx="9278645" cy="4039164"/>
           </a:xfrm>
         </p:spPr>
       </p:pic>
+      <p:sp>
+        <p:nvSpPr>
+          <p:cNvPr id="3" name="Content Placeholder 2">
+            <a:extLst>
+              <a:ext uri="{FF2B5EF4-FFF2-40B4-BE49-F238E27FC236}">
+                <a16:creationId xmlns:a16="http://schemas.microsoft.com/office/drawing/2014/main" id="{AD614032-F735-278F-5D66-EFE899783DB7}"/>
+              </a:ext>
+            </a:extLst>
+          </p:cNvPr>
+          <p:cNvSpPr txBox="1">
+            <a:spLocks/>
+          </p:cNvSpPr>
+          <p:nvPr/>
+        </p:nvSpPr>
+        <p:spPr>
+          <a:xfrm>
+            <a:off x="9861953" y="1345223"/>
+            <a:ext cx="3751385" cy="4428565"/>
+          </a:xfrm>
+          <a:prstGeom prst="rect">
+            <a:avLst/>
+          </a:prstGeom>
+        </p:spPr>
+        <p:txBody>
+          <a:bodyPr vert="horz" lIns="91440" tIns="45720" rIns="91440" bIns="45720" rtlCol="0">
+            <a:normAutofit/>
+          </a:bodyPr>
+          <a:lstStyle>
+            <a:lvl1pPr marL="228600" indent="-228600" algn="l" defTabSz="914400" rtl="0" eaLnBrk="1" latinLnBrk="0" hangingPunct="1">
+              <a:lnSpc>
+                <a:spcPct val="90000"/>
+              </a:lnSpc>
+              <a:spcBef>
+                <a:spcPts val="1000"/>
+              </a:spcBef>
+              <a:buFont typeface="Arial" panose="020B0604020202020204" pitchFamily="34" charset="0"/>
+              <a:buChar char="•"/>
+              <a:defRPr sz="2800" kern="1200">
+                <a:solidFill>
+                  <a:schemeClr val="tx1"/>
+                </a:solidFill>
+                <a:latin typeface="+mn-lt"/>
+                <a:ea typeface="+mn-ea"/>
+                <a:cs typeface="+mn-cs"/>
+              </a:defRPr>
+            </a:lvl1pPr>
+            <a:lvl2pPr marL="685800" indent="-228600" algn="l" defTabSz="914400" rtl="0" eaLnBrk="1" latinLnBrk="0" hangingPunct="1">
+              <a:lnSpc>
+                <a:spcPct val="90000"/>
+              </a:lnSpc>
+              <a:spcBef>
+                <a:spcPts val="500"/>
+              </a:spcBef>
+              <a:buFont typeface="Arial" panose="020B0604020202020204" pitchFamily="34" charset="0"/>
+              <a:buChar char="•"/>
+              <a:defRPr sz="2400" kern="1200">
+                <a:solidFill>
+                  <a:schemeClr val="tx1"/>
+                </a:solidFill>
+                <a:latin typeface="+mn-lt"/>
+                <a:ea typeface="+mn-ea"/>
+                <a:cs typeface="+mn-cs"/>
+              </a:defRPr>
+            </a:lvl2pPr>
+            <a:lvl3pPr marL="1143000" indent="-228600" algn="l" defTabSz="914400" rtl="0" eaLnBrk="1" latinLnBrk="0" hangingPunct="1">
+              <a:lnSpc>
+                <a:spcPct val="90000"/>
+              </a:lnSpc>
+              <a:spcBef>
+                <a:spcPts val="500"/>
+              </a:spcBef>
+              <a:buFont typeface="Arial" panose="020B0604020202020204" pitchFamily="34" charset="0"/>
+              <a:buChar char="•"/>
+              <a:defRPr sz="2000" kern="1200">
+                <a:solidFill>
+                  <a:schemeClr val="tx1"/>
+                </a:solidFill>
+                <a:latin typeface="+mn-lt"/>
+                <a:ea typeface="+mn-ea"/>
+                <a:cs typeface="+mn-cs"/>
+              </a:defRPr>
+            </a:lvl3pPr>
+            <a:lvl4pPr marL="1600200" indent="-228600" algn="l" defTabSz="914400" rtl="0" eaLnBrk="1" latinLnBrk="0" hangingPunct="1">
+              <a:lnSpc>
+                <a:spcPct val="90000"/>
+              </a:lnSpc>
+              <a:spcBef>
+                <a:spcPts val="500"/>
+              </a:spcBef>
+              <a:buFont typeface="Arial" panose="020B0604020202020204" pitchFamily="34" charset="0"/>
+              <a:buChar char="•"/>
+              <a:defRPr sz="1800" kern="1200">
+                <a:solidFill>
+                  <a:schemeClr val="tx1"/>
+                </a:solidFill>
+                <a:latin typeface="+mn-lt"/>
+                <a:ea typeface="+mn-ea"/>
+                <a:cs typeface="+mn-cs"/>
+              </a:defRPr>
+            </a:lvl4pPr>
+            <a:lvl5pPr marL="2057400" indent="-228600" algn="l" defTabSz="914400" rtl="0" eaLnBrk="1" latinLnBrk="0" hangingPunct="1">
+              <a:lnSpc>
+                <a:spcPct val="90000"/>
+              </a:lnSpc>
+              <a:spcBef>
+                <a:spcPts val="500"/>
+              </a:spcBef>
+              <a:buFont typeface="Arial" panose="020B0604020202020204" pitchFamily="34" charset="0"/>
+              <a:buChar char="•"/>
+              <a:defRPr sz="1800" kern="1200">
+                <a:solidFill>
+                  <a:schemeClr val="tx1"/>
+                </a:solidFill>
+                <a:latin typeface="+mn-lt"/>
+                <a:ea typeface="+mn-ea"/>
+                <a:cs typeface="+mn-cs"/>
+              </a:defRPr>
+            </a:lvl5pPr>
+            <a:lvl6pPr marL="2514600" indent="-228600" algn="l" defTabSz="914400" rtl="0" eaLnBrk="1" latinLnBrk="0" hangingPunct="1">
+              <a:lnSpc>
+                <a:spcPct val="90000"/>
+              </a:lnSpc>
+              <a:spcBef>
+                <a:spcPts val="500"/>
+              </a:spcBef>
+              <a:buFont typeface="Arial" panose="020B0604020202020204" pitchFamily="34" charset="0"/>
+              <a:buChar char="•"/>
+              <a:defRPr sz="1800" kern="1200">
+                <a:solidFill>
+                  <a:schemeClr val="tx1"/>
+                </a:solidFill>
+                <a:latin typeface="+mn-lt"/>
+                <a:ea typeface="+mn-ea"/>
+                <a:cs typeface="+mn-cs"/>
+              </a:defRPr>
+            </a:lvl6pPr>
+            <a:lvl7pPr marL="2971800" indent="-228600" algn="l" defTabSz="914400" rtl="0" eaLnBrk="1" latinLnBrk="0" hangingPunct="1">
+              <a:lnSpc>
+                <a:spcPct val="90000"/>
+              </a:lnSpc>
+              <a:spcBef>
+                <a:spcPts val="500"/>
+              </a:spcBef>
+              <a:buFont typeface="Arial" panose="020B0604020202020204" pitchFamily="34" charset="0"/>
+              <a:buChar char="•"/>
+              <a:defRPr sz="1800" kern="1200">
+                <a:solidFill>
+                  <a:schemeClr val="tx1"/>
+                </a:solidFill>
+                <a:latin typeface="+mn-lt"/>
+                <a:ea typeface="+mn-ea"/>
+                <a:cs typeface="+mn-cs"/>
+              </a:defRPr>
+            </a:lvl7pPr>
+            <a:lvl8pPr marL="3429000" indent="-228600" algn="l" defTabSz="914400" rtl="0" eaLnBrk="1" latinLnBrk="0" hangingPunct="1">
+              <a:lnSpc>
+                <a:spcPct val="90000"/>
+              </a:lnSpc>
+              <a:spcBef>
+                <a:spcPts val="500"/>
+              </a:spcBef>
+              <a:buFont typeface="Arial" panose="020B0604020202020204" pitchFamily="34" charset="0"/>
+              <a:buChar char="•"/>
+              <a:defRPr sz="1800" kern="1200">
+                <a:solidFill>
+                  <a:schemeClr val="tx1"/>
+                </a:solidFill>
+                <a:latin typeface="+mn-lt"/>
+                <a:ea typeface="+mn-ea"/>
+                <a:cs typeface="+mn-cs"/>
+              </a:defRPr>
+            </a:lvl8pPr>
+            <a:lvl9pPr marL="3886200" indent="-228600" algn="l" defTabSz="914400" rtl="0" eaLnBrk="1" latinLnBrk="0" hangingPunct="1">
+              <a:lnSpc>
+                <a:spcPct val="90000"/>
+              </a:lnSpc>
+              <a:spcBef>
+                <a:spcPts val="500"/>
+              </a:spcBef>
+              <a:buFont typeface="Arial" panose="020B0604020202020204" pitchFamily="34" charset="0"/>
+              <a:buChar char="•"/>
+              <a:defRPr sz="1800" kern="1200">
+                <a:solidFill>
+                  <a:schemeClr val="tx1"/>
+                </a:solidFill>
+                <a:latin typeface="+mn-lt"/>
+                <a:ea typeface="+mn-ea"/>
+                <a:cs typeface="+mn-cs"/>
+              </a:defRPr>
+            </a:lvl9pPr>
+          </a:lstStyle>
+          <a:p>
+            <a:r>
+              <a:rPr lang="en-US" sz="1600" dirty="0"/>
+              <a:t>THEIR RESULTS IN OCTAVE</a:t>
+            </a:r>
+          </a:p>
+          <a:p>
+            <a:r>
+              <a:rPr lang="en-US" sz="1600" dirty="0"/>
+              <a:t>R0 = [4.6198e-3, 1.7810e-3, 1.1351e-3]</a:t>
+            </a:r>
+          </a:p>
+          <a:p>
+            <a:r>
+              <a:rPr lang="en-US" sz="1600" dirty="0"/>
+              <a:t>Eta = [0.98174, 0.99102, 0.98965]</a:t>
+            </a:r>
+          </a:p>
+          <a:p>
+            <a:r>
+              <a:rPr lang="en-US" sz="1600" dirty="0" err="1"/>
+              <a:t>Qparam</a:t>
+            </a:r>
+            <a:r>
+              <a:rPr lang="en-US" sz="1600" dirty="0"/>
+              <a:t> = [14.592, 14.532, 14.444]</a:t>
+            </a:r>
+          </a:p>
+          <a:p>
+            <a:r>
+              <a:rPr lang="en-US" sz="1600" dirty="0" err="1"/>
+              <a:t>Rparam</a:t>
+            </a:r>
+            <a:r>
+              <a:rPr lang="en-US" sz="1600" dirty="0"/>
+              <a:t> = [0.0008368, 0.64769e-3, 0.000535]</a:t>
+            </a:r>
+          </a:p>
+          <a:p>
+            <a:r>
+              <a:rPr lang="en-US" sz="1600" dirty="0" err="1"/>
+              <a:t>Rcparam</a:t>
+            </a:r>
+            <a:r>
+              <a:rPr lang="en-US" sz="1600" dirty="0"/>
+              <a:t> = [2.3844, 5.1555, 4.2939]</a:t>
+            </a:r>
+          </a:p>
+          <a:p>
+            <a:r>
+              <a:rPr lang="en-US" sz="1600" dirty="0" err="1"/>
+              <a:t>Cparam</a:t>
+            </a:r>
+            <a:r>
+              <a:rPr lang="en-US" sz="1600" dirty="0"/>
+              <a:t> = 7.9598e3</a:t>
+            </a:r>
+          </a:p>
+          <a:p>
+            <a:r>
+              <a:rPr lang="en-US" sz="1600" dirty="0"/>
+              <a:t>M0Param = [0.0031315, 0.0023535, 0.0011502]</a:t>
+            </a:r>
+          </a:p>
+          <a:p>
+            <a:r>
+              <a:rPr lang="en-US" sz="1600" dirty="0" err="1"/>
+              <a:t>Mparam</a:t>
+            </a:r>
+            <a:r>
+              <a:rPr lang="en-US" sz="1600" dirty="0"/>
+              <a:t> = [0.039929, 0.020018, 0.020545]</a:t>
+            </a:r>
+          </a:p>
+          <a:p>
+            <a:r>
+              <a:rPr lang="en-US" sz="1600" dirty="0" err="1"/>
+              <a:t>Gparam</a:t>
+            </a:r>
+            <a:r>
+              <a:rPr lang="en-US" sz="1600" dirty="0"/>
+              <a:t> = [67.207, 92.645, 67.840]</a:t>
+            </a:r>
+          </a:p>
+        </p:txBody>
+      </p:sp>
     </p:spTree>
     <p:extLst>
       <p:ext uri="{BB962C8B-B14F-4D97-AF65-F5344CB8AC3E}">
-        <p14:creationId xmlns:p14="http://schemas.microsoft.com/office/powerpoint/2010/main" val="2125761180"/>
+        <p14:creationId xmlns:p14="http://schemas.microsoft.com/office/powerpoint/2010/main" val="1005993150"/>
       </p:ext>
     </p:extLst>
   </p:cSld>
@@ -3696,7 +6086,7 @@
           <p:cNvPr id="2" name="Title 1">
             <a:extLst>
               <a:ext uri="{FF2B5EF4-FFF2-40B4-BE49-F238E27FC236}">
-                <a16:creationId xmlns:a16="http://schemas.microsoft.com/office/drawing/2014/main" id="{10EC8F80-2E78-6043-5608-C6C83843FCA0}"/>
+                <a16:creationId xmlns:a16="http://schemas.microsoft.com/office/drawing/2014/main" id="{26BA39E5-A558-003C-6217-A68A77011566}"/>
               </a:ext>
             </a:extLst>
           </p:cNvPr>
@@ -3712,49 +6102,42 @@
           <a:bodyPr/>
           <a:lstStyle/>
           <a:p>
+            <a:r>
+              <a:rPr lang="en-US" dirty="0"/>
+              <a:t>OCV default vs OCV parsed (should be the same)</a:t>
+            </a:r>
+          </a:p>
+        </p:txBody>
+      </p:sp>
+      <p:sp>
+        <p:nvSpPr>
+          <p:cNvPr id="3" name="Content Placeholder 2">
+            <a:extLst>
+              <a:ext uri="{FF2B5EF4-FFF2-40B4-BE49-F238E27FC236}">
+                <a16:creationId xmlns:a16="http://schemas.microsoft.com/office/drawing/2014/main" id="{AEDAF5E0-5AAF-00F6-850C-CEBD5C679CA6}"/>
+              </a:ext>
+            </a:extLst>
+          </p:cNvPr>
+          <p:cNvSpPr>
+            <a:spLocks noGrp="1"/>
+          </p:cNvSpPr>
+          <p:nvPr>
+            <p:ph idx="1"/>
+          </p:nvPr>
+        </p:nvSpPr>
+        <p:spPr/>
+        <p:txBody>
+          <a:bodyPr/>
+          <a:lstStyle/>
+          <a:p>
             <a:endParaRPr lang="en-US" dirty="0"/>
           </a:p>
         </p:txBody>
       </p:sp>
-      <p:pic>
-        <p:nvPicPr>
-          <p:cNvPr id="5" name="Content Placeholder 4">
-            <a:extLst>
-              <a:ext uri="{FF2B5EF4-FFF2-40B4-BE49-F238E27FC236}">
-                <a16:creationId xmlns:a16="http://schemas.microsoft.com/office/drawing/2014/main" id="{057E8117-4269-261E-809B-EA9EFC42A638}"/>
-              </a:ext>
-            </a:extLst>
-          </p:cNvPr>
-          <p:cNvPicPr>
-            <a:picLocks noGrp="1" noChangeAspect="1"/>
-          </p:cNvPicPr>
-          <p:nvPr>
-            <p:ph idx="1"/>
-          </p:nvPr>
-        </p:nvPicPr>
-        <p:blipFill>
-          <a:blip r:embed="rId2">
-            <a:extLst>
-              <a:ext uri="{28A0092B-C50C-407E-A947-70E740481C1C}">
-                <a14:useLocalDpi xmlns:a14="http://schemas.microsoft.com/office/drawing/2010/main" val="0"/>
-              </a:ext>
-            </a:extLst>
-          </a:blip>
-          <a:stretch>
-            <a:fillRect/>
-          </a:stretch>
-        </p:blipFill>
-        <p:spPr>
-          <a:xfrm>
-            <a:off x="1755776" y="1825625"/>
-            <a:ext cx="8680447" cy="4351338"/>
-          </a:xfrm>
-        </p:spPr>
-      </p:pic>
     </p:spTree>
     <p:extLst>
       <p:ext uri="{BB962C8B-B14F-4D97-AF65-F5344CB8AC3E}">
-        <p14:creationId xmlns:p14="http://schemas.microsoft.com/office/powerpoint/2010/main" val="3704438772"/>
+        <p14:creationId xmlns:p14="http://schemas.microsoft.com/office/powerpoint/2010/main" val="499224619"/>
       </p:ext>
     </p:extLst>
   </p:cSld>
@@ -3786,7 +6169,7 @@
           <p:cNvPr id="2" name="Title 1">
             <a:extLst>
               <a:ext uri="{FF2B5EF4-FFF2-40B4-BE49-F238E27FC236}">
-                <a16:creationId xmlns:a16="http://schemas.microsoft.com/office/drawing/2014/main" id="{C6ECB4E4-28FC-8AF8-1857-AEBD17253F41}"/>
+                <a16:creationId xmlns:a16="http://schemas.microsoft.com/office/drawing/2014/main" id="{2BC5A533-6E21-CA62-E715-8E44FC5164E5}"/>
               </a:ext>
             </a:extLst>
           </p:cNvPr>
@@ -3803,10 +6186,17 @@
           <a:lstStyle/>
           <a:p>
             <a:r>
+              <a:rPr lang="en-US" dirty="0"/>
+              <a:t>Problems probably come from </a:t>
+            </a:r>
+            <a:r>
               <a:rPr lang="en-US" dirty="0" err="1"/>
-              <a:t>dynamic_scripts_current</a:t>
-            </a:r>
-            <a:endParaRPr lang="en-US" dirty="0"/>
+              <a:t>v_error</a:t>
+            </a:r>
+            <a:r>
+              <a:rPr lang="en-US" dirty="0"/>
+              <a:t> and corrected current calculation</a:t>
+            </a:r>
           </a:p>
         </p:txBody>
       </p:sp>
@@ -3815,7 +6205,7 @@
           <p:cNvPr id="5" name="Content Placeholder 4">
             <a:extLst>
               <a:ext uri="{FF2B5EF4-FFF2-40B4-BE49-F238E27FC236}">
-                <a16:creationId xmlns:a16="http://schemas.microsoft.com/office/drawing/2014/main" id="{B4AB8A20-2EB1-76CB-55EB-F83B0B27AD86}"/>
+                <a16:creationId xmlns:a16="http://schemas.microsoft.com/office/drawing/2014/main" id="{00B22049-6476-CC2E-BE9B-84688FAD8246}"/>
               </a:ext>
             </a:extLst>
           </p:cNvPr>
@@ -3840,15 +6230,15 @@
         </p:blipFill>
         <p:spPr>
           <a:xfrm>
-            <a:off x="1767208" y="1825625"/>
-            <a:ext cx="8657584" cy="4351338"/>
+            <a:off x="1744662" y="1825625"/>
+            <a:ext cx="8702676" cy="4351338"/>
           </a:xfrm>
         </p:spPr>
       </p:pic>
     </p:spTree>
     <p:extLst>
       <p:ext uri="{BB962C8B-B14F-4D97-AF65-F5344CB8AC3E}">
-        <p14:creationId xmlns:p14="http://schemas.microsoft.com/office/powerpoint/2010/main" val="625157402"/>
+        <p14:creationId xmlns:p14="http://schemas.microsoft.com/office/powerpoint/2010/main" val="2125761180"/>
       </p:ext>
     </p:extLst>
   </p:cSld>
@@ -3880,7 +6270,7 @@
           <p:cNvPr id="2" name="Title 1">
             <a:extLst>
               <a:ext uri="{FF2B5EF4-FFF2-40B4-BE49-F238E27FC236}">
-                <a16:creationId xmlns:a16="http://schemas.microsoft.com/office/drawing/2014/main" id="{0888D369-E37E-2609-82F4-E5AC57D30D6A}"/>
+                <a16:creationId xmlns:a16="http://schemas.microsoft.com/office/drawing/2014/main" id="{10EC8F80-2E78-6043-5608-C6C83843FCA0}"/>
               </a:ext>
             </a:extLst>
           </p:cNvPr>
@@ -3896,10 +6286,6 @@
           <a:bodyPr/>
           <a:lstStyle/>
           <a:p>
-            <a:r>
-              <a:rPr lang="en-US" dirty="0" err="1"/>
-              <a:t>dynamic_scripts_voltage</a:t>
-            </a:r>
             <a:endParaRPr lang="en-US" dirty="0"/>
           </a:p>
         </p:txBody>
@@ -3909,7 +6295,7 @@
           <p:cNvPr id="5" name="Content Placeholder 4">
             <a:extLst>
               <a:ext uri="{FF2B5EF4-FFF2-40B4-BE49-F238E27FC236}">
-                <a16:creationId xmlns:a16="http://schemas.microsoft.com/office/drawing/2014/main" id="{F4DE829B-BFCF-9A6E-06CA-69119B1DE97A}"/>
+                <a16:creationId xmlns:a16="http://schemas.microsoft.com/office/drawing/2014/main" id="{057E8117-4269-261E-809B-EA9EFC42A638}"/>
               </a:ext>
             </a:extLst>
           </p:cNvPr>
@@ -3934,15 +6320,15 @@
         </p:blipFill>
         <p:spPr>
           <a:xfrm>
-            <a:off x="1795063" y="1825625"/>
-            <a:ext cx="8601873" cy="4351338"/>
+            <a:off x="1755776" y="1825625"/>
+            <a:ext cx="8680447" cy="4351338"/>
           </a:xfrm>
         </p:spPr>
       </p:pic>
     </p:spTree>
     <p:extLst>
       <p:ext uri="{BB962C8B-B14F-4D97-AF65-F5344CB8AC3E}">
-        <p14:creationId xmlns:p14="http://schemas.microsoft.com/office/powerpoint/2010/main" val="2320186843"/>
+        <p14:creationId xmlns:p14="http://schemas.microsoft.com/office/powerpoint/2010/main" val="3704438772"/>
       </p:ext>
     </p:extLst>
   </p:cSld>
@@ -3974,7 +6360,7 @@
           <p:cNvPr id="2" name="Title 1">
             <a:extLst>
               <a:ext uri="{FF2B5EF4-FFF2-40B4-BE49-F238E27FC236}">
-                <a16:creationId xmlns:a16="http://schemas.microsoft.com/office/drawing/2014/main" id="{61F06C22-F136-3D87-EC33-FBF92BBA6D1C}"/>
+                <a16:creationId xmlns:a16="http://schemas.microsoft.com/office/drawing/2014/main" id="{C6ECB4E4-28FC-8AF8-1857-AEBD17253F41}"/>
               </a:ext>
             </a:extLst>
           </p:cNvPr>
@@ -3992,7 +6378,7 @@
           <a:p>
             <a:r>
               <a:rPr lang="en-US" dirty="0" err="1"/>
-              <a:t>static_scripts_current</a:t>
+              <a:t>dynamic_scripts_current</a:t>
             </a:r>
             <a:endParaRPr lang="en-US" dirty="0"/>
           </a:p>
@@ -4003,7 +6389,7 @@
           <p:cNvPr id="5" name="Content Placeholder 4">
             <a:extLst>
               <a:ext uri="{FF2B5EF4-FFF2-40B4-BE49-F238E27FC236}">
-                <a16:creationId xmlns:a16="http://schemas.microsoft.com/office/drawing/2014/main" id="{809C4B67-0EDB-E69D-1940-9FEB7D026D3C}"/>
+                <a16:creationId xmlns:a16="http://schemas.microsoft.com/office/drawing/2014/main" id="{B4AB8A20-2EB1-76CB-55EB-F83B0B27AD86}"/>
               </a:ext>
             </a:extLst>
           </p:cNvPr>
@@ -4036,7 +6422,101 @@
     </p:spTree>
     <p:extLst>
       <p:ext uri="{BB962C8B-B14F-4D97-AF65-F5344CB8AC3E}">
-        <p14:creationId xmlns:p14="http://schemas.microsoft.com/office/powerpoint/2010/main" val="1003531755"/>
+        <p14:creationId xmlns:p14="http://schemas.microsoft.com/office/powerpoint/2010/main" val="625157402"/>
+      </p:ext>
+    </p:extLst>
+  </p:cSld>
+  <p:clrMapOvr>
+    <a:masterClrMapping/>
+  </p:clrMapOvr>
+</p:sld>
+</file>
+
+<file path=ppt/slides/slide9.xml><?xml version="1.0" encoding="utf-8"?>
+<p:sld xmlns:a="http://schemas.openxmlformats.org/drawingml/2006/main" xmlns:r="http://schemas.openxmlformats.org/officeDocument/2006/relationships" xmlns:p="http://schemas.openxmlformats.org/presentationml/2006/main">
+  <p:cSld>
+    <p:spTree>
+      <p:nvGrpSpPr>
+        <p:cNvPr id="1" name=""/>
+        <p:cNvGrpSpPr/>
+        <p:nvPr/>
+      </p:nvGrpSpPr>
+      <p:grpSpPr>
+        <a:xfrm>
+          <a:off x="0" y="0"/>
+          <a:ext cx="0" cy="0"/>
+          <a:chOff x="0" y="0"/>
+          <a:chExt cx="0" cy="0"/>
+        </a:xfrm>
+      </p:grpSpPr>
+      <p:sp>
+        <p:nvSpPr>
+          <p:cNvPr id="2" name="Title 1">
+            <a:extLst>
+              <a:ext uri="{FF2B5EF4-FFF2-40B4-BE49-F238E27FC236}">
+                <a16:creationId xmlns:a16="http://schemas.microsoft.com/office/drawing/2014/main" id="{0888D369-E37E-2609-82F4-E5AC57D30D6A}"/>
+              </a:ext>
+            </a:extLst>
+          </p:cNvPr>
+          <p:cNvSpPr>
+            <a:spLocks noGrp="1"/>
+          </p:cNvSpPr>
+          <p:nvPr>
+            <p:ph type="title"/>
+          </p:nvPr>
+        </p:nvSpPr>
+        <p:spPr/>
+        <p:txBody>
+          <a:bodyPr/>
+          <a:lstStyle/>
+          <a:p>
+            <a:r>
+              <a:rPr lang="en-US" dirty="0" err="1"/>
+              <a:t>dynamic_scripts_voltage</a:t>
+            </a:r>
+            <a:endParaRPr lang="en-US" dirty="0"/>
+          </a:p>
+        </p:txBody>
+      </p:sp>
+      <p:pic>
+        <p:nvPicPr>
+          <p:cNvPr id="5" name="Content Placeholder 4">
+            <a:extLst>
+              <a:ext uri="{FF2B5EF4-FFF2-40B4-BE49-F238E27FC236}">
+                <a16:creationId xmlns:a16="http://schemas.microsoft.com/office/drawing/2014/main" id="{F4DE829B-BFCF-9A6E-06CA-69119B1DE97A}"/>
+              </a:ext>
+            </a:extLst>
+          </p:cNvPr>
+          <p:cNvPicPr>
+            <a:picLocks noGrp="1" noChangeAspect="1"/>
+          </p:cNvPicPr>
+          <p:nvPr>
+            <p:ph idx="1"/>
+          </p:nvPr>
+        </p:nvPicPr>
+        <p:blipFill>
+          <a:blip r:embed="rId2">
+            <a:extLst>
+              <a:ext uri="{28A0092B-C50C-407E-A947-70E740481C1C}">
+                <a14:useLocalDpi xmlns:a14="http://schemas.microsoft.com/office/drawing/2010/main" val="0"/>
+              </a:ext>
+            </a:extLst>
+          </a:blip>
+          <a:stretch>
+            <a:fillRect/>
+          </a:stretch>
+        </p:blipFill>
+        <p:spPr>
+          <a:xfrm>
+            <a:off x="1795063" y="1825625"/>
+            <a:ext cx="8601873" cy="4351338"/>
+          </a:xfrm>
+        </p:spPr>
+      </p:pic>
+    </p:spTree>
+    <p:extLst>
+      <p:ext uri="{BB962C8B-B14F-4D97-AF65-F5344CB8AC3E}">
+        <p14:creationId xmlns:p14="http://schemas.microsoft.com/office/powerpoint/2010/main" val="2320186843"/>
       </p:ext>
     </p:extLst>
   </p:cSld>

</xml_diff>